<commit_message>
Presentation with all the content.
</commit_message>
<xml_diff>
--- a/docs/Checkpoint II - Presentation.pptx
+++ b/docs/Checkpoint II - Presentation.pptx
@@ -5,10 +5,10 @@
     <p:sldMasterId id="2147483648" r:id="rId1"/>
   </p:sldMasterIdLst>
   <p:notesMasterIdLst>
-    <p:notesMasterId r:id="rId19"/>
+    <p:notesMasterId r:id="rId20"/>
   </p:notesMasterIdLst>
   <p:handoutMasterIdLst>
-    <p:handoutMasterId r:id="rId20"/>
+    <p:handoutMasterId r:id="rId21"/>
   </p:handoutMasterIdLst>
   <p:sldIdLst>
     <p:sldId id="256" r:id="rId2"/>
@@ -22,12 +22,13 @@
     <p:sldId id="1106" r:id="rId10"/>
     <p:sldId id="1109" r:id="rId11"/>
     <p:sldId id="1107" r:id="rId12"/>
-    <p:sldId id="1101" r:id="rId13"/>
-    <p:sldId id="1102" r:id="rId14"/>
-    <p:sldId id="1108" r:id="rId15"/>
-    <p:sldId id="1103" r:id="rId16"/>
-    <p:sldId id="1104" r:id="rId17"/>
-    <p:sldId id="1110" r:id="rId18"/>
+    <p:sldId id="1111" r:id="rId13"/>
+    <p:sldId id="1101" r:id="rId14"/>
+    <p:sldId id="1102" r:id="rId15"/>
+    <p:sldId id="1108" r:id="rId16"/>
+    <p:sldId id="1103" r:id="rId17"/>
+    <p:sldId id="1104" r:id="rId18"/>
+    <p:sldId id="1110" r:id="rId19"/>
   </p:sldIdLst>
   <p:sldSz cx="9144000" cy="6858000" type="screen4x3"/>
   <p:notesSz cx="6858000" cy="9144000"/>
@@ -227,7 +228,7 @@
           <a:p>
             <a:fld id="{745C36E7-9E00-462E-80A3-32F2BE615C7A}" type="datetimeFigureOut">
               <a:rPr lang="en-US" smtClean="0"/>
-              <a:t>10/15/2018</a:t>
+              <a:t>10/16/2018</a:t>
             </a:fld>
             <a:endParaRPr lang="en-US"/>
           </a:p>
@@ -393,7 +394,7 @@
             <a:fld id="{01F3E309-ED8D-4193-99AF-E5EA90965E98}" type="datetimeFigureOut">
               <a:rPr lang="en-US" smtClean="0"/>
               <a:pPr/>
-              <a:t>10/15/2018</a:t>
+              <a:t>10/16/2018</a:t>
             </a:fld>
             <a:endParaRPr lang="en-US"/>
           </a:p>
@@ -814,7 +815,7 @@
             <a:fld id="{F535F173-C1DD-4975-94BF-5B9ED67F7674}" type="slidenum">
               <a:rPr lang="en-US" smtClean="0"/>
               <a:pPr/>
-              <a:t>16</a:t>
+              <a:t>17</a:t>
             </a:fld>
             <a:endParaRPr lang="en-US"/>
           </a:p>
@@ -1409,7 +1410,7 @@
             <a:fld id="{F535F173-C1DD-4975-94BF-5B9ED67F7674}" type="slidenum">
               <a:rPr lang="en-US" smtClean="0"/>
               <a:pPr/>
-              <a:t>13</a:t>
+              <a:t>14</a:t>
             </a:fld>
             <a:endParaRPr lang="en-US"/>
           </a:p>
@@ -1494,7 +1495,7 @@
             <a:fld id="{F535F173-C1DD-4975-94BF-5B9ED67F7674}" type="slidenum">
               <a:rPr lang="en-US" smtClean="0"/>
               <a:pPr/>
-              <a:t>14</a:t>
+              <a:t>15</a:t>
             </a:fld>
             <a:endParaRPr lang="en-US"/>
           </a:p>
@@ -2005,7 +2006,7 @@
             <a:fld id="{F3CC9924-33BC-4796-B0F9-D37DB5D899BF}" type="datetimeFigureOut">
               <a:rPr lang="pt-PT" smtClean="0"/>
               <a:pPr/>
-              <a:t>15/10/2018</a:t>
+              <a:t>16/10/2018</a:t>
             </a:fld>
             <a:endParaRPr lang="pt-PT"/>
           </a:p>
@@ -3786,8 +3787,8 @@
         </p:nvSpPr>
         <p:spPr>
           <a:xfrm>
-            <a:off x="0" y="4572008"/>
-            <a:ext cx="1979712" cy="2286016"/>
+            <a:off x="0" y="4571984"/>
+            <a:ext cx="1728192" cy="2286016"/>
           </a:xfrm>
           <a:solidFill>
             <a:schemeClr val="bg1"/>
@@ -3803,7 +3804,7 @@
                   <a:schemeClr val="bg2"/>
                 </a:solidFill>
               </a:rPr>
-              <a:t>GX-A/T</a:t>
+              <a:t>G13-A</a:t>
             </a:r>
           </a:p>
         </p:txBody>
@@ -3818,8 +3819,8 @@
         </p:nvSpPr>
         <p:spPr>
           <a:xfrm>
-            <a:off x="1979712" y="4571984"/>
-            <a:ext cx="2285984" cy="2286016"/>
+            <a:off x="1619672" y="5085184"/>
+            <a:ext cx="3240360" cy="1628800"/>
           </a:xfrm>
           <a:prstGeom prst="rect">
             <a:avLst/>
@@ -3974,96 +3975,33 @@
           </a:lstStyle>
           <a:p>
             <a:r>
-              <a:rPr lang="pt-PT" sz="2400" b="0" dirty="0" err="1">
+              <a:rPr lang="pt-PT" sz="2400" b="0" dirty="0">
                 <a:solidFill>
                   <a:schemeClr val="bg2"/>
                 </a:solidFill>
               </a:rPr>
-              <a:t>Number</a:t>
-            </a:r>
+              <a:t>83463 – Francisco Campaniço</a:t>
+            </a:r>
+          </a:p>
+          <a:p>
             <a:r>
               <a:rPr lang="pt-PT" sz="2400" b="0" dirty="0">
                 <a:solidFill>
                   <a:schemeClr val="bg2"/>
                 </a:solidFill>
               </a:rPr>
-              <a:t> – </a:t>
-            </a:r>
-            <a:r>
-              <a:rPr lang="pt-PT" sz="2400" b="0" dirty="0" err="1">
+              <a:t>83482 – João Rafael</a:t>
+            </a:r>
+          </a:p>
+          <a:p>
+            <a:r>
+              <a:rPr lang="pt-PT" sz="2400" b="0" dirty="0">
                 <a:solidFill>
                   <a:schemeClr val="bg2"/>
                 </a:solidFill>
               </a:rPr>
-              <a:t>Name</a:t>
-            </a:r>
-            <a:endParaRPr lang="pt-PT" sz="2400" b="0" dirty="0">
-              <a:solidFill>
-                <a:schemeClr val="bg2"/>
-              </a:solidFill>
-            </a:endParaRPr>
-          </a:p>
-          <a:p>
-            <a:r>
-              <a:rPr lang="pt-PT" sz="2400" b="0" dirty="0" err="1">
-                <a:solidFill>
-                  <a:schemeClr val="bg2"/>
-                </a:solidFill>
-              </a:rPr>
-              <a:t>Number</a:t>
-            </a:r>
-            <a:r>
-              <a:rPr lang="pt-PT" sz="2400" b="0" dirty="0">
-                <a:solidFill>
-                  <a:schemeClr val="bg2"/>
-                </a:solidFill>
-              </a:rPr>
-              <a:t> – </a:t>
-            </a:r>
-            <a:r>
-              <a:rPr lang="pt-PT" sz="2400" b="0" dirty="0" err="1">
-                <a:solidFill>
-                  <a:schemeClr val="bg2"/>
-                </a:solidFill>
-              </a:rPr>
-              <a:t>Name</a:t>
-            </a:r>
-            <a:endParaRPr lang="pt-PT" sz="2400" b="0" dirty="0">
-              <a:solidFill>
-                <a:schemeClr val="bg2"/>
-              </a:solidFill>
-            </a:endParaRPr>
-          </a:p>
-          <a:p>
-            <a:r>
-              <a:rPr lang="pt-PT" sz="2400" b="0" dirty="0" err="1">
-                <a:solidFill>
-                  <a:schemeClr val="bg2"/>
-                </a:solidFill>
-              </a:rPr>
-              <a:t>Number</a:t>
-            </a:r>
-            <a:r>
-              <a:rPr lang="pt-PT" sz="2400" b="0" dirty="0">
-                <a:solidFill>
-                  <a:schemeClr val="bg2"/>
-                </a:solidFill>
-              </a:rPr>
-              <a:t> – </a:t>
-            </a:r>
-            <a:r>
-              <a:rPr lang="pt-PT" sz="2400" b="0" dirty="0" err="1">
-                <a:solidFill>
-                  <a:schemeClr val="bg2"/>
-                </a:solidFill>
-              </a:rPr>
-              <a:t>Name</a:t>
-            </a:r>
-            <a:endParaRPr lang="pt-PT" sz="2400" b="0" dirty="0">
-              <a:solidFill>
-                <a:schemeClr val="bg2"/>
-              </a:solidFill>
-            </a:endParaRPr>
+              <a:t>83558 – Rodrigo Oliveira</a:t>
+            </a:r>
           </a:p>
         </p:txBody>
       </p:sp>
@@ -4463,12 +4401,32 @@
               <a:t>countryName</a:t>
             </a:r>
             <a:r>
+              <a:rPr lang="en-GB" sz="1600" b="0" dirty="0">
+                <a:solidFill>
+                  <a:schemeClr val="tx1"/>
+                </a:solidFill>
+                <a:latin typeface="Courier New" panose="02070309020205020404" pitchFamily="49" charset="0"/>
+                <a:cs typeface="Courier New" panose="02070309020205020404" pitchFamily="49" charset="0"/>
+              </a:rPr>
+              <a:t>, </a:t>
+            </a:r>
+            <a:r>
+              <a:rPr lang="en-GB" sz="1600" b="0" dirty="0" err="1">
+                <a:solidFill>
+                  <a:schemeClr val="tx1"/>
+                </a:solidFill>
+                <a:latin typeface="Courier New" panose="02070309020205020404" pitchFamily="49" charset="0"/>
+                <a:cs typeface="Courier New" panose="02070309020205020404" pitchFamily="49" charset="0"/>
+              </a:rPr>
+              <a:t>countryCode</a:t>
+            </a:r>
+            <a:r>
               <a:rPr lang="en-GB" sz="2000" b="0" dirty="0">
                 <a:solidFill>
                   <a:schemeClr val="tx1"/>
                 </a:solidFill>
               </a:rPr>
-              <a:t>: nominal; identifies a country.</a:t>
+              <a:t>: nominal; both identify a country.</a:t>
             </a:r>
             <a:endParaRPr lang="pt-PT" sz="2000" b="0" dirty="0">
               <a:solidFill>
@@ -4629,12 +4587,18 @@
       </p:grpSpPr>
       <p:sp>
         <p:nvSpPr>
-          <p:cNvPr id="6" name="Text Placeholder 5"/>
-          <p:cNvSpPr>
-            <a:spLocks noGrp="1"/>
-          </p:cNvSpPr>
-          <p:nvPr>
-            <p:ph type="body" sz="quarter" idx="11"/>
+          <p:cNvPr id="2" name="Title 1">
+            <a:extLst>
+              <a:ext uri="{FF2B5EF4-FFF2-40B4-BE49-F238E27FC236}">
+                <a16:creationId xmlns:a16="http://schemas.microsoft.com/office/drawing/2014/main" id="{731AFCE9-49F2-4C8B-8779-F8F06B14F66F}"/>
+              </a:ext>
+            </a:extLst>
+          </p:cNvPr>
+          <p:cNvSpPr>
+            <a:spLocks noGrp="1"/>
+          </p:cNvSpPr>
+          <p:nvPr>
+            <p:ph type="title"/>
           </p:nvPr>
         </p:nvSpPr>
         <p:spPr/>
@@ -4642,80 +4606,273 @@
           <a:bodyPr/>
           <a:lstStyle/>
           <a:p>
-            <a:endParaRPr lang="en-US" dirty="0"/>
-          </a:p>
-        </p:txBody>
-      </p:sp>
-      <p:sp>
-        <p:nvSpPr>
-          <p:cNvPr id="29" name="Text Placeholder 28"/>
-          <p:cNvSpPr>
-            <a:spLocks noGrp="1"/>
-          </p:cNvSpPr>
-          <p:nvPr>
-            <p:ph type="body" sz="quarter" idx="10"/>
-          </p:nvPr>
-        </p:nvSpPr>
-        <p:spPr/>
-        <p:txBody>
-          <a:bodyPr/>
-          <a:lstStyle/>
-          <a:p>
-            <a:r>
-              <a:rPr lang="pt-PT" sz="16600" dirty="0"/>
-              <a:t>04</a:t>
-            </a:r>
-          </a:p>
-        </p:txBody>
-      </p:sp>
-      <p:sp>
-        <p:nvSpPr>
-          <p:cNvPr id="4" name="Title 3"/>
-          <p:cNvSpPr>
-            <a:spLocks noGrp="1"/>
-          </p:cNvSpPr>
-          <p:nvPr>
-            <p:ph type="title"/>
+            <a:endParaRPr lang="pt-PT"/>
+          </a:p>
+        </p:txBody>
+      </p:sp>
+      <p:sp>
+        <p:nvSpPr>
+          <p:cNvPr id="3" name="Content Placeholder 2">
+            <a:extLst>
+              <a:ext uri="{FF2B5EF4-FFF2-40B4-BE49-F238E27FC236}">
+                <a16:creationId xmlns:a16="http://schemas.microsoft.com/office/drawing/2014/main" id="{EE204C6F-3E76-43C9-9E4A-E5BDAA511FC8}"/>
+              </a:ext>
+            </a:extLst>
+          </p:cNvPr>
+          <p:cNvSpPr>
+            <a:spLocks noGrp="1"/>
+          </p:cNvSpPr>
+          <p:nvPr>
+            <p:ph idx="1"/>
           </p:nvPr>
         </p:nvSpPr>
         <p:spPr>
           <a:xfrm>
-            <a:off x="2281222" y="3214686"/>
-            <a:ext cx="6786578" cy="3033714"/>
+            <a:off x="457200" y="1285860"/>
+            <a:ext cx="8229600" cy="5214974"/>
           </a:xfrm>
-          <a:solidFill>
-            <a:srgbClr val="FFFFFF">
-              <a:alpha val="80000"/>
-            </a:srgbClr>
-          </a:solidFill>
         </p:spPr>
         <p:txBody>
-          <a:bodyPr rIns="288000">
-            <a:noAutofit/>
+          <a:bodyPr>
+            <a:normAutofit/>
           </a:bodyPr>
           <a:lstStyle/>
           <a:p>
-            <a:pPr marL="0" algn="r"/>
-            <a:r>
-              <a:rPr lang="pt-PT" sz="6000" dirty="0" err="1"/>
-              <a:t>Dataset</a:t>
-            </a:r>
-            <a:r>
-              <a:rPr lang="pt-PT" sz="6000" dirty="0"/>
-              <a:t> </a:t>
-            </a:r>
-            <a:r>
-              <a:rPr lang="pt-PT" sz="6000" dirty="0" err="1"/>
-              <a:t>processing</a:t>
-            </a:r>
-            <a:endParaRPr lang="pt-PT" sz="6000" dirty="0"/>
+            <a:r>
+              <a:rPr lang="en-GB" sz="2800" dirty="0">
+                <a:solidFill>
+                  <a:schemeClr val="tx1"/>
+                </a:solidFill>
+              </a:rPr>
+              <a:t>Tournaments</a:t>
+            </a:r>
+          </a:p>
+          <a:p>
+            <a:r>
+              <a:rPr lang="en-GB" sz="2000" b="0" dirty="0">
+                <a:solidFill>
+                  <a:schemeClr val="tx1"/>
+                </a:solidFill>
+              </a:rPr>
+              <a:t>Static table </a:t>
+            </a:r>
+            <a:r>
+              <a:rPr lang="en-GB" sz="1600" b="0" dirty="0" err="1">
+                <a:solidFill>
+                  <a:schemeClr val="tx1"/>
+                </a:solidFill>
+                <a:latin typeface="Courier New" panose="02070309020205020404" pitchFamily="49" charset="0"/>
+                <a:cs typeface="Courier New" panose="02070309020205020404" pitchFamily="49" charset="0"/>
+              </a:rPr>
+              <a:t>tournaments.json</a:t>
+            </a:r>
+            <a:r>
+              <a:rPr lang="en-GB" sz="2000" b="0" dirty="0">
+                <a:solidFill>
+                  <a:schemeClr val="tx1"/>
+                </a:solidFill>
+              </a:rPr>
+              <a:t>, containing game and tournament IDs, start and end dates, and the total prize. </a:t>
+            </a:r>
+          </a:p>
+          <a:p>
+            <a:r>
+              <a:rPr lang="en-GB" sz="2000" dirty="0">
+                <a:solidFill>
+                  <a:schemeClr val="tx1"/>
+                </a:solidFill>
+              </a:rPr>
+              <a:t>Attributes</a:t>
+            </a:r>
+            <a:r>
+              <a:rPr lang="en-GB" sz="2000" b="0" dirty="0">
+                <a:solidFill>
+                  <a:schemeClr val="tx1"/>
+                </a:solidFill>
+              </a:rPr>
+              <a:t>:</a:t>
+            </a:r>
+            <a:endParaRPr lang="pt-PT" sz="2000" b="0" dirty="0">
+              <a:solidFill>
+                <a:schemeClr val="tx1"/>
+              </a:solidFill>
+            </a:endParaRPr>
+          </a:p>
+          <a:p>
+            <a:pPr lvl="1">
+              <a:buFont typeface="Arial" panose="020B0604020202020204" pitchFamily="34" charset="0"/>
+              <a:buChar char="•"/>
+            </a:pPr>
+            <a:r>
+              <a:rPr lang="en-GB" sz="1600" b="0" dirty="0" err="1">
+                <a:solidFill>
+                  <a:schemeClr val="tx1"/>
+                </a:solidFill>
+                <a:latin typeface="Courier New" panose="02070309020205020404" pitchFamily="49" charset="0"/>
+                <a:cs typeface="Courier New" panose="02070309020205020404" pitchFamily="49" charset="0"/>
+              </a:rPr>
+              <a:t>gameId</a:t>
+            </a:r>
+            <a:r>
+              <a:rPr lang="en-GB" sz="2000" b="0" dirty="0">
+                <a:solidFill>
+                  <a:schemeClr val="tx1"/>
+                </a:solidFill>
+              </a:rPr>
+              <a:t>, </a:t>
+            </a:r>
+            <a:r>
+              <a:rPr lang="en-GB" sz="1600" b="0" dirty="0" err="1">
+                <a:solidFill>
+                  <a:schemeClr val="tx1"/>
+                </a:solidFill>
+                <a:latin typeface="Courier New" panose="02070309020205020404" pitchFamily="49" charset="0"/>
+                <a:cs typeface="Courier New" panose="02070309020205020404" pitchFamily="49" charset="0"/>
+              </a:rPr>
+              <a:t>tournamentId</a:t>
+            </a:r>
+            <a:r>
+              <a:rPr lang="en-GB" sz="2000" b="0" dirty="0">
+                <a:solidFill>
+                  <a:schemeClr val="tx1"/>
+                </a:solidFill>
+              </a:rPr>
+              <a:t>: nominal; they identify the game played and the tournament respectively.</a:t>
+            </a:r>
+            <a:endParaRPr lang="pt-PT" sz="2000" b="0" dirty="0">
+              <a:solidFill>
+                <a:schemeClr val="tx1"/>
+              </a:solidFill>
+            </a:endParaRPr>
+          </a:p>
+          <a:p>
+            <a:pPr lvl="1">
+              <a:buFont typeface="Arial" panose="020B0604020202020204" pitchFamily="34" charset="0"/>
+              <a:buChar char="•"/>
+            </a:pPr>
+            <a:r>
+              <a:rPr lang="en-GB" sz="1600" b="0" dirty="0" err="1">
+                <a:solidFill>
+                  <a:schemeClr val="tx1"/>
+                </a:solidFill>
+                <a:latin typeface="Courier New" panose="02070309020205020404" pitchFamily="49" charset="0"/>
+                <a:cs typeface="Courier New" panose="02070309020205020404" pitchFamily="49" charset="0"/>
+              </a:rPr>
+              <a:t>startDate</a:t>
+            </a:r>
+            <a:r>
+              <a:rPr lang="en-GB" sz="2000" b="0" dirty="0">
+                <a:solidFill>
+                  <a:schemeClr val="tx1"/>
+                </a:solidFill>
+              </a:rPr>
+              <a:t>, </a:t>
+            </a:r>
+            <a:r>
+              <a:rPr lang="en-GB" sz="1600" b="0" dirty="0" err="1">
+                <a:solidFill>
+                  <a:schemeClr val="tx1"/>
+                </a:solidFill>
+                <a:latin typeface="Courier New" panose="02070309020205020404" pitchFamily="49" charset="0"/>
+                <a:cs typeface="Courier New" panose="02070309020205020404" pitchFamily="49" charset="0"/>
+              </a:rPr>
+              <a:t>endDate</a:t>
+            </a:r>
+            <a:r>
+              <a:rPr lang="en-GB" sz="2000" b="0" dirty="0">
+                <a:solidFill>
+                  <a:schemeClr val="tx1"/>
+                </a:solidFill>
+              </a:rPr>
+              <a:t>: quantitative, hierarchical; start and ending dates for the tournament</a:t>
+            </a:r>
+            <a:endParaRPr lang="pt-PT" sz="2000" b="0" dirty="0">
+              <a:solidFill>
+                <a:schemeClr val="tx1"/>
+              </a:solidFill>
+            </a:endParaRPr>
+          </a:p>
+          <a:p>
+            <a:pPr lvl="1">
+              <a:buFont typeface="Arial" panose="020B0604020202020204" pitchFamily="34" charset="0"/>
+              <a:buChar char="•"/>
+            </a:pPr>
+            <a:r>
+              <a:rPr lang="pt-PT" sz="1600" b="0" dirty="0" err="1">
+                <a:solidFill>
+                  <a:schemeClr val="tx1"/>
+                </a:solidFill>
+                <a:latin typeface="Courier New" panose="02070309020205020404" pitchFamily="49" charset="0"/>
+                <a:cs typeface="Courier New" panose="02070309020205020404" pitchFamily="49" charset="0"/>
+              </a:rPr>
+              <a:t>totalUSDPrize</a:t>
+            </a:r>
+            <a:r>
+              <a:rPr lang="pt-PT" sz="2000" b="0" dirty="0">
+                <a:solidFill>
+                  <a:schemeClr val="tx1"/>
+                </a:solidFill>
+              </a:rPr>
+              <a:t>: </a:t>
+            </a:r>
+            <a:r>
+              <a:rPr lang="pt-PT" sz="2000" b="0" dirty="0" err="1">
+                <a:solidFill>
+                  <a:schemeClr val="tx1"/>
+                </a:solidFill>
+              </a:rPr>
+              <a:t>quantitative</a:t>
+            </a:r>
+            <a:r>
+              <a:rPr lang="pt-PT" sz="2000" b="0" dirty="0">
+                <a:solidFill>
+                  <a:schemeClr val="tx1"/>
+                </a:solidFill>
+              </a:rPr>
+              <a:t>, ratio; </a:t>
+            </a:r>
+            <a:r>
+              <a:rPr lang="pt-PT" sz="2000" b="0" dirty="0" err="1">
+                <a:solidFill>
+                  <a:schemeClr val="tx1"/>
+                </a:solidFill>
+              </a:rPr>
+              <a:t>tournament’s</a:t>
+            </a:r>
+            <a:r>
+              <a:rPr lang="pt-PT" sz="2000" b="0" dirty="0">
+                <a:solidFill>
+                  <a:schemeClr val="tx1"/>
+                </a:solidFill>
+              </a:rPr>
+              <a:t> total </a:t>
+            </a:r>
+            <a:r>
+              <a:rPr lang="pt-PT" sz="2000" b="0" dirty="0" err="1">
+                <a:solidFill>
+                  <a:schemeClr val="tx1"/>
+                </a:solidFill>
+              </a:rPr>
+              <a:t>prize</a:t>
+            </a:r>
+            <a:r>
+              <a:rPr lang="pt-PT" sz="2000" b="0" dirty="0">
+                <a:solidFill>
+                  <a:schemeClr val="tx1"/>
+                </a:solidFill>
+              </a:rPr>
+              <a:t> pool.</a:t>
+            </a:r>
+          </a:p>
+          <a:p>
+            <a:endParaRPr lang="pt-PT" dirty="0"/>
           </a:p>
         </p:txBody>
       </p:sp>
     </p:spTree>
     <p:extLst>
       <p:ext uri="{BB962C8B-B14F-4D97-AF65-F5344CB8AC3E}">
-        <p14:creationId xmlns:p14="http://schemas.microsoft.com/office/powerpoint/2010/main" val="4045494449"/>
+        <p14:creationId xmlns:p14="http://schemas.microsoft.com/office/powerpoint/2010/main" val="1969371256"/>
       </p:ext>
     </p:extLst>
   </p:cSld>
@@ -4744,12 +4901,12 @@
       </p:grpSpPr>
       <p:sp>
         <p:nvSpPr>
-          <p:cNvPr id="2" name="Title 1"/>
-          <p:cNvSpPr>
-            <a:spLocks noGrp="1"/>
-          </p:cNvSpPr>
-          <p:nvPr>
-            <p:ph type="title"/>
+          <p:cNvPr id="6" name="Text Placeholder 5"/>
+          <p:cNvSpPr>
+            <a:spLocks noGrp="1"/>
+          </p:cNvSpPr>
+          <p:nvPr>
+            <p:ph type="body" sz="quarter" idx="11"/>
           </p:nvPr>
         </p:nvSpPr>
         <p:spPr/>
@@ -4757,100 +4914,80 @@
           <a:bodyPr/>
           <a:lstStyle/>
           <a:p>
-            <a:r>
-              <a:rPr lang="en-US" dirty="0"/>
-              <a:t>Dataset processing</a:t>
-            </a:r>
-            <a:endParaRPr lang="pt-PT" dirty="0"/>
-          </a:p>
-        </p:txBody>
-      </p:sp>
-      <p:sp>
-        <p:nvSpPr>
-          <p:cNvPr id="3" name="Content Placeholder 2"/>
-          <p:cNvSpPr>
-            <a:spLocks noGrp="1"/>
-          </p:cNvSpPr>
-          <p:nvPr>
-            <p:ph idx="1"/>
+            <a:endParaRPr lang="en-US" dirty="0"/>
+          </a:p>
+        </p:txBody>
+      </p:sp>
+      <p:sp>
+        <p:nvSpPr>
+          <p:cNvPr id="29" name="Text Placeholder 28"/>
+          <p:cNvSpPr>
+            <a:spLocks noGrp="1"/>
+          </p:cNvSpPr>
+          <p:nvPr>
+            <p:ph type="body" sz="quarter" idx="10"/>
+          </p:nvPr>
+        </p:nvSpPr>
+        <p:spPr/>
+        <p:txBody>
+          <a:bodyPr/>
+          <a:lstStyle/>
+          <a:p>
+            <a:r>
+              <a:rPr lang="pt-PT" sz="16600" dirty="0"/>
+              <a:t>04</a:t>
+            </a:r>
+          </a:p>
+        </p:txBody>
+      </p:sp>
+      <p:sp>
+        <p:nvSpPr>
+          <p:cNvPr id="4" name="Title 3"/>
+          <p:cNvSpPr>
+            <a:spLocks noGrp="1"/>
+          </p:cNvSpPr>
+          <p:nvPr>
+            <p:ph type="title"/>
           </p:nvPr>
         </p:nvSpPr>
         <p:spPr>
           <a:xfrm>
-            <a:off x="457200" y="1094346"/>
-            <a:ext cx="8229600" cy="5214974"/>
+            <a:off x="2281222" y="3214686"/>
+            <a:ext cx="6786578" cy="3033714"/>
           </a:xfrm>
+          <a:solidFill>
+            <a:srgbClr val="FFFFFF">
+              <a:alpha val="80000"/>
+            </a:srgbClr>
+          </a:solidFill>
         </p:spPr>
         <p:txBody>
-          <a:bodyPr>
+          <a:bodyPr rIns="288000">
             <a:noAutofit/>
           </a:bodyPr>
           <a:lstStyle/>
           <a:p>
-            <a:r>
-              <a:rPr lang="en-US" sz="4000" dirty="0"/>
-              <a:t>Dataset cleaning description</a:t>
-            </a:r>
-          </a:p>
-          <a:p>
-            <a:r>
-              <a:rPr lang="en-US" sz="4000" b="0" dirty="0">
-                <a:solidFill>
-                  <a:schemeClr val="tx1"/>
-                </a:solidFill>
-              </a:rPr>
-              <a:t>	</a:t>
-            </a:r>
-            <a:r>
-              <a:rPr lang="en-GB" sz="2400" b="0" dirty="0">
-                <a:solidFill>
-                  <a:schemeClr val="tx1"/>
-                </a:solidFill>
-              </a:rPr>
-              <a:t>The data for games, teams and players was obtained directly from the esportsearnings.com API.</a:t>
-            </a:r>
-            <a:endParaRPr lang="pt-PT" sz="2400" b="0" dirty="0">
-              <a:solidFill>
-                <a:schemeClr val="tx1"/>
-              </a:solidFill>
-            </a:endParaRPr>
-          </a:p>
-          <a:p>
-            <a:r>
-              <a:rPr lang="en-GB" sz="2400" b="0" dirty="0">
-                <a:solidFill>
-                  <a:schemeClr val="tx1"/>
-                </a:solidFill>
-              </a:rPr>
-              <a:t>	Player earnings by age data was scraped from the same site (using a node.js script to go to each player’s “Tournaments won by age” page and making a .json file from it.)</a:t>
-            </a:r>
-            <a:endParaRPr lang="pt-PT" sz="2400" b="0" dirty="0">
-              <a:solidFill>
-                <a:schemeClr val="tx1"/>
-              </a:solidFill>
-            </a:endParaRPr>
-          </a:p>
-          <a:p>
-            <a:r>
-              <a:rPr lang="en-GB" sz="2400" b="0" dirty="0">
-                <a:solidFill>
-                  <a:schemeClr val="tx1"/>
-                </a:solidFill>
-              </a:rPr>
-              <a:t>	Country data was obtained from the worldbank.org API in .xlsx format and converted to .json afterwards, with the use of a Python script.</a:t>
-            </a:r>
-            <a:endParaRPr lang="pt-PT" sz="2400" b="0" dirty="0">
-              <a:solidFill>
-                <a:schemeClr val="tx1"/>
-              </a:solidFill>
-            </a:endParaRPr>
+            <a:pPr marL="0" algn="r"/>
+            <a:r>
+              <a:rPr lang="pt-PT" sz="6000" dirty="0" err="1"/>
+              <a:t>Dataset</a:t>
+            </a:r>
+            <a:r>
+              <a:rPr lang="pt-PT" sz="6000" dirty="0"/>
+              <a:t> </a:t>
+            </a:r>
+            <a:r>
+              <a:rPr lang="pt-PT" sz="6000" dirty="0" err="1"/>
+              <a:t>processing</a:t>
+            </a:r>
+            <a:endParaRPr lang="pt-PT" sz="6000" dirty="0"/>
           </a:p>
         </p:txBody>
       </p:sp>
     </p:spTree>
     <p:extLst>
       <p:ext uri="{BB962C8B-B14F-4D97-AF65-F5344CB8AC3E}">
-        <p14:creationId xmlns:p14="http://schemas.microsoft.com/office/powerpoint/2010/main" val="3456915046"/>
+        <p14:creationId xmlns:p14="http://schemas.microsoft.com/office/powerpoint/2010/main" val="4045494449"/>
       </p:ext>
     </p:extLst>
   </p:cSld>
@@ -4924,55 +5061,68 @@
           <a:p>
             <a:r>
               <a:rPr lang="en-US" sz="4000" dirty="0"/>
-              <a:t>Problems found:</a:t>
-            </a:r>
-          </a:p>
-          <a:p>
-            <a:pPr lvl="1"/>
-            <a:r>
-              <a:rPr lang="en-US" dirty="0"/>
-              <a:t>Problem: players’ earnings by age weren’t available in the API</a:t>
-            </a:r>
-          </a:p>
-          <a:p>
-            <a:pPr lvl="1"/>
-            <a:r>
-              <a:rPr lang="en-US" dirty="0"/>
-              <a:t>Solution: scraping each players page to get the data, since it’s available in plaintext.</a:t>
-            </a:r>
-          </a:p>
-          <a:p>
-            <a:pPr lvl="1"/>
-            <a:endParaRPr lang="en-US" dirty="0"/>
-          </a:p>
-          <a:p>
-            <a:pPr lvl="1"/>
-            <a:r>
-              <a:rPr lang="en-US" dirty="0"/>
-              <a:t>Problem 2 </a:t>
-            </a:r>
-            <a:r>
-              <a:rPr lang="en-US" b="1" dirty="0"/>
-              <a:t>TBA</a:t>
-            </a:r>
-            <a:endParaRPr lang="en-US" dirty="0"/>
-          </a:p>
-          <a:p>
-            <a:pPr lvl="1"/>
-            <a:r>
-              <a:rPr lang="en-US" dirty="0"/>
-              <a:t>Solution</a:t>
-            </a:r>
-          </a:p>
-          <a:p>
-            <a:endParaRPr lang="en-US" sz="4000" dirty="0"/>
+              <a:t>Dataset cleaning description</a:t>
+            </a:r>
+          </a:p>
+          <a:p>
+            <a:r>
+              <a:rPr lang="en-US" sz="4000" b="0" dirty="0">
+                <a:solidFill>
+                  <a:schemeClr val="tx1"/>
+                </a:solidFill>
+              </a:rPr>
+              <a:t>	</a:t>
+            </a:r>
+            <a:r>
+              <a:rPr lang="en-GB" sz="2400" b="0" dirty="0">
+                <a:solidFill>
+                  <a:schemeClr val="tx1"/>
+                </a:solidFill>
+              </a:rPr>
+              <a:t>The data for games, teams and players was obtained directly from the esportsearnings.com API.</a:t>
+            </a:r>
+            <a:endParaRPr lang="pt-PT" sz="2400" b="0" dirty="0">
+              <a:solidFill>
+                <a:schemeClr val="tx1"/>
+              </a:solidFill>
+            </a:endParaRPr>
+          </a:p>
+          <a:p>
+            <a:r>
+              <a:rPr lang="en-GB" sz="2400" b="0" dirty="0">
+                <a:solidFill>
+                  <a:schemeClr val="tx1"/>
+                </a:solidFill>
+              </a:rPr>
+              <a:t>	Player earnings by age data was scraped from the same site (using a node.js script to go to each player’s “Tournaments won by age” page and making a .json file from it.)</a:t>
+            </a:r>
+            <a:endParaRPr lang="pt-PT" sz="2400" b="0" dirty="0">
+              <a:solidFill>
+                <a:schemeClr val="tx1"/>
+              </a:solidFill>
+            </a:endParaRPr>
+          </a:p>
+          <a:p>
+            <a:r>
+              <a:rPr lang="en-GB" sz="2400" b="0" dirty="0">
+                <a:solidFill>
+                  <a:schemeClr val="tx1"/>
+                </a:solidFill>
+              </a:rPr>
+              <a:t>	Country data was obtained from the worldbank.org API in .xlsx format and converted to .json afterwards, with the use of a Python script.</a:t>
+            </a:r>
+            <a:endParaRPr lang="pt-PT" sz="2400" b="0" dirty="0">
+              <a:solidFill>
+                <a:schemeClr val="tx1"/>
+              </a:solidFill>
+            </a:endParaRPr>
           </a:p>
         </p:txBody>
       </p:sp>
     </p:spTree>
     <p:extLst>
       <p:ext uri="{BB962C8B-B14F-4D97-AF65-F5344CB8AC3E}">
-        <p14:creationId xmlns:p14="http://schemas.microsoft.com/office/powerpoint/2010/main" val="2665434140"/>
+        <p14:creationId xmlns:p14="http://schemas.microsoft.com/office/powerpoint/2010/main" val="3456915046"/>
       </p:ext>
     </p:extLst>
   </p:cSld>
@@ -5001,12 +5151,12 @@
       </p:grpSpPr>
       <p:sp>
         <p:nvSpPr>
-          <p:cNvPr id="6" name="Text Placeholder 5"/>
-          <p:cNvSpPr>
-            <a:spLocks noGrp="1"/>
-          </p:cNvSpPr>
-          <p:nvPr>
-            <p:ph type="body" sz="quarter" idx="11"/>
+          <p:cNvPr id="2" name="Title 1"/>
+          <p:cNvSpPr>
+            <a:spLocks noGrp="1"/>
+          </p:cNvSpPr>
+          <p:nvPr>
+            <p:ph type="title"/>
           </p:nvPr>
         </p:nvSpPr>
         <p:spPr/>
@@ -5014,72 +5164,79 @@
           <a:bodyPr/>
           <a:lstStyle/>
           <a:p>
-            <a:endParaRPr lang="en-US" dirty="0"/>
-          </a:p>
-        </p:txBody>
-      </p:sp>
-      <p:sp>
-        <p:nvSpPr>
-          <p:cNvPr id="29" name="Text Placeholder 28"/>
-          <p:cNvSpPr>
-            <a:spLocks noGrp="1"/>
-          </p:cNvSpPr>
-          <p:nvPr>
-            <p:ph type="body" sz="quarter" idx="10"/>
-          </p:nvPr>
-        </p:nvSpPr>
-        <p:spPr/>
-        <p:txBody>
-          <a:bodyPr/>
-          <a:lstStyle/>
-          <a:p>
-            <a:r>
-              <a:rPr lang="pt-PT" sz="16600" dirty="0"/>
-              <a:t>05</a:t>
-            </a:r>
-          </a:p>
-        </p:txBody>
-      </p:sp>
-      <p:sp>
-        <p:nvSpPr>
-          <p:cNvPr id="4" name="Title 3"/>
-          <p:cNvSpPr>
-            <a:spLocks noGrp="1"/>
-          </p:cNvSpPr>
-          <p:nvPr>
-            <p:ph type="title"/>
+            <a:r>
+              <a:rPr lang="en-US" dirty="0"/>
+              <a:t>Dataset processing</a:t>
+            </a:r>
+            <a:endParaRPr lang="pt-PT" dirty="0"/>
+          </a:p>
+        </p:txBody>
+      </p:sp>
+      <p:sp>
+        <p:nvSpPr>
+          <p:cNvPr id="3" name="Content Placeholder 2"/>
+          <p:cNvSpPr>
+            <a:spLocks noGrp="1"/>
+          </p:cNvSpPr>
+          <p:nvPr>
+            <p:ph idx="1"/>
           </p:nvPr>
         </p:nvSpPr>
         <p:spPr>
           <a:xfrm>
-            <a:off x="2281222" y="3214686"/>
-            <a:ext cx="6786578" cy="3033714"/>
+            <a:off x="457200" y="1094346"/>
+            <a:ext cx="8229600" cy="5214974"/>
           </a:xfrm>
-          <a:solidFill>
-            <a:srgbClr val="FFFFFF">
-              <a:alpha val="80000"/>
-            </a:srgbClr>
-          </a:solidFill>
         </p:spPr>
         <p:txBody>
-          <a:bodyPr rIns="288000">
+          <a:bodyPr>
             <a:noAutofit/>
           </a:bodyPr>
           <a:lstStyle/>
           <a:p>
-            <a:pPr marL="0" algn="r"/>
-            <a:r>
-              <a:rPr lang="pt-PT" sz="6000" dirty="0" err="1"/>
-              <a:t>Mapping</a:t>
-            </a:r>
-            <a:endParaRPr lang="pt-PT" sz="6000" dirty="0"/>
+            <a:r>
+              <a:rPr lang="en-US" sz="4000" dirty="0"/>
+              <a:t>Problems found:</a:t>
+            </a:r>
+          </a:p>
+          <a:p>
+            <a:pPr lvl="1"/>
+            <a:r>
+              <a:rPr lang="en-US" sz="2400" dirty="0"/>
+              <a:t>Problem: Players’ earnings by age weren’t available in the API</a:t>
+            </a:r>
+          </a:p>
+          <a:p>
+            <a:pPr lvl="1"/>
+            <a:r>
+              <a:rPr lang="en-US" sz="2400" dirty="0"/>
+              <a:t>Solution: Scraping each players page to get the data, since it’s available in plaintext.</a:t>
+            </a:r>
+          </a:p>
+          <a:p>
+            <a:pPr lvl="1"/>
+            <a:endParaRPr lang="en-US" sz="2400" dirty="0"/>
+          </a:p>
+          <a:p>
+            <a:pPr lvl="1"/>
+            <a:r>
+              <a:rPr lang="en-US" sz="2400" dirty="0"/>
+              <a:t>Problem: The API only let us get 100 players/tournaments/teams and 1 game at a time, with a maximum of 1 query every 2 seconds.</a:t>
+            </a:r>
+          </a:p>
+          <a:p>
+            <a:pPr lvl="1"/>
+            <a:r>
+              <a:rPr lang="en-US" sz="2400" dirty="0"/>
+              <a:t>Solution: Writing a script for automating data collection.</a:t>
+            </a:r>
           </a:p>
         </p:txBody>
       </p:sp>
     </p:spTree>
     <p:extLst>
       <p:ext uri="{BB962C8B-B14F-4D97-AF65-F5344CB8AC3E}">
-        <p14:creationId xmlns:p14="http://schemas.microsoft.com/office/powerpoint/2010/main" val="2312607420"/>
+        <p14:creationId xmlns:p14="http://schemas.microsoft.com/office/powerpoint/2010/main" val="2665434140"/>
       </p:ext>
     </p:extLst>
   </p:cSld>
@@ -5108,12 +5265,12 @@
       </p:grpSpPr>
       <p:sp>
         <p:nvSpPr>
-          <p:cNvPr id="2" name="Title 1"/>
-          <p:cNvSpPr>
-            <a:spLocks noGrp="1"/>
-          </p:cNvSpPr>
-          <p:nvPr>
-            <p:ph type="title"/>
+          <p:cNvPr id="6" name="Text Placeholder 5"/>
+          <p:cNvSpPr>
+            <a:spLocks noGrp="1"/>
+          </p:cNvSpPr>
+          <p:nvPr>
+            <p:ph type="body" sz="quarter" idx="11"/>
           </p:nvPr>
         </p:nvSpPr>
         <p:spPr/>
@@ -5121,134 +5278,72 @@
           <a:bodyPr/>
           <a:lstStyle/>
           <a:p>
-            <a:r>
-              <a:rPr lang="en-US" dirty="0"/>
-              <a:t>Mapping</a:t>
-            </a:r>
-            <a:endParaRPr lang="pt-PT" dirty="0"/>
-          </a:p>
-        </p:txBody>
-      </p:sp>
-      <p:sp>
-        <p:nvSpPr>
-          <p:cNvPr id="5" name="Content Placeholder 2"/>
-          <p:cNvSpPr>
-            <a:spLocks noGrp="1"/>
-          </p:cNvSpPr>
-          <p:nvPr>
-            <p:ph idx="1"/>
+            <a:endParaRPr lang="en-US" dirty="0"/>
+          </a:p>
+        </p:txBody>
+      </p:sp>
+      <p:sp>
+        <p:nvSpPr>
+          <p:cNvPr id="29" name="Text Placeholder 28"/>
+          <p:cNvSpPr>
+            <a:spLocks noGrp="1"/>
+          </p:cNvSpPr>
+          <p:nvPr>
+            <p:ph type="body" sz="quarter" idx="10"/>
+          </p:nvPr>
+        </p:nvSpPr>
+        <p:spPr/>
+        <p:txBody>
+          <a:bodyPr/>
+          <a:lstStyle/>
+          <a:p>
+            <a:r>
+              <a:rPr lang="pt-PT" sz="16600" dirty="0"/>
+              <a:t>05</a:t>
+            </a:r>
+          </a:p>
+        </p:txBody>
+      </p:sp>
+      <p:sp>
+        <p:nvSpPr>
+          <p:cNvPr id="4" name="Title 3"/>
+          <p:cNvSpPr>
+            <a:spLocks noGrp="1"/>
+          </p:cNvSpPr>
+          <p:nvPr>
+            <p:ph type="title"/>
           </p:nvPr>
         </p:nvSpPr>
         <p:spPr>
           <a:xfrm>
-            <a:off x="457200" y="1094346"/>
-            <a:ext cx="8229600" cy="5214974"/>
+            <a:off x="2281222" y="3214686"/>
+            <a:ext cx="6786578" cy="3033714"/>
           </a:xfrm>
+          <a:solidFill>
+            <a:srgbClr val="FFFFFF">
+              <a:alpha val="80000"/>
+            </a:srgbClr>
+          </a:solidFill>
         </p:spPr>
         <p:txBody>
-          <a:bodyPr>
+          <a:bodyPr rIns="288000">
             <a:noAutofit/>
           </a:bodyPr>
           <a:lstStyle/>
           <a:p>
-            <a:pPr lvl="0"/>
-            <a:r>
-              <a:rPr lang="en-GB" sz="2800" dirty="0">
-                <a:solidFill>
-                  <a:schemeClr val="tx1"/>
-                </a:solidFill>
-              </a:rPr>
-              <a:t>What countries have the highest earnings?</a:t>
-            </a:r>
-            <a:endParaRPr lang="pt-PT" sz="2800" dirty="0">
-              <a:solidFill>
-                <a:schemeClr val="tx1"/>
-              </a:solidFill>
-            </a:endParaRPr>
-          </a:p>
-          <a:p>
-            <a:r>
-              <a:rPr lang="en-GB" sz="2800" b="0" dirty="0">
-                <a:solidFill>
-                  <a:schemeClr val="tx1"/>
-                </a:solidFill>
-              </a:rPr>
-              <a:t>Group players by countries and get the sum of their earnings.</a:t>
-            </a:r>
-            <a:endParaRPr lang="pt-PT" sz="2800" b="0" dirty="0">
-              <a:solidFill>
-                <a:schemeClr val="tx1"/>
-              </a:solidFill>
-            </a:endParaRPr>
-          </a:p>
-          <a:p>
-            <a:pPr lvl="0"/>
-            <a:r>
-              <a:rPr lang="en-GB" sz="2800" dirty="0">
-                <a:solidFill>
-                  <a:schemeClr val="tx1"/>
-                </a:solidFill>
-              </a:rPr>
-              <a:t>What is the age at which players earn the most?</a:t>
-            </a:r>
-            <a:endParaRPr lang="pt-PT" sz="2800" dirty="0">
-              <a:solidFill>
-                <a:schemeClr val="tx1"/>
-              </a:solidFill>
-            </a:endParaRPr>
-          </a:p>
-          <a:p>
-            <a:r>
-              <a:rPr lang="en-GB" sz="2800" b="0" dirty="0">
-                <a:solidFill>
-                  <a:schemeClr val="tx1"/>
-                </a:solidFill>
-              </a:rPr>
-              <a:t>Compare each player’s earnings by age.</a:t>
-            </a:r>
-            <a:endParaRPr lang="pt-PT" sz="2800" b="0" dirty="0">
-              <a:solidFill>
-                <a:schemeClr val="tx1"/>
-              </a:solidFill>
-            </a:endParaRPr>
-          </a:p>
-          <a:p>
-            <a:pPr lvl="0"/>
-            <a:r>
-              <a:rPr lang="en-GB" sz="2800" dirty="0">
-                <a:solidFill>
-                  <a:schemeClr val="tx1"/>
-                </a:solidFill>
-              </a:rPr>
-              <a:t>What organizations earned the most?</a:t>
-            </a:r>
-            <a:endParaRPr lang="pt-PT" sz="2800" dirty="0">
-              <a:solidFill>
-                <a:schemeClr val="tx1"/>
-              </a:solidFill>
-            </a:endParaRPr>
-          </a:p>
-          <a:p>
-            <a:r>
-              <a:rPr lang="en-GB" sz="2800" b="0" dirty="0">
-                <a:solidFill>
-                  <a:schemeClr val="tx1"/>
-                </a:solidFill>
-              </a:rPr>
-              <a:t>Sort the teams table by earnings.</a:t>
-            </a:r>
-            <a:endParaRPr lang="pt-PT" sz="2800" b="0" dirty="0">
-              <a:solidFill>
-                <a:schemeClr val="tx1"/>
-              </a:solidFill>
-            </a:endParaRPr>
+            <a:pPr marL="0" algn="r"/>
+            <a:r>
+              <a:rPr lang="pt-PT" sz="6000" dirty="0" err="1"/>
+              <a:t>Mapping</a:t>
+            </a:r>
+            <a:endParaRPr lang="pt-PT" sz="6000" dirty="0"/>
           </a:p>
         </p:txBody>
       </p:sp>
     </p:spTree>
     <p:extLst>
       <p:ext uri="{BB962C8B-B14F-4D97-AF65-F5344CB8AC3E}">
-        <p14:creationId xmlns:p14="http://schemas.microsoft.com/office/powerpoint/2010/main" val="2292396113"/>
+        <p14:creationId xmlns:p14="http://schemas.microsoft.com/office/powerpoint/2010/main" val="2312607420"/>
       </p:ext>
     </p:extLst>
   </p:cSld>
@@ -5277,6 +5372,175 @@
       </p:grpSpPr>
       <p:sp>
         <p:nvSpPr>
+          <p:cNvPr id="2" name="Title 1"/>
+          <p:cNvSpPr>
+            <a:spLocks noGrp="1"/>
+          </p:cNvSpPr>
+          <p:nvPr>
+            <p:ph type="title"/>
+          </p:nvPr>
+        </p:nvSpPr>
+        <p:spPr/>
+        <p:txBody>
+          <a:bodyPr/>
+          <a:lstStyle/>
+          <a:p>
+            <a:r>
+              <a:rPr lang="en-US" dirty="0"/>
+              <a:t>Mapping</a:t>
+            </a:r>
+            <a:endParaRPr lang="pt-PT" dirty="0"/>
+          </a:p>
+        </p:txBody>
+      </p:sp>
+      <p:sp>
+        <p:nvSpPr>
+          <p:cNvPr id="5" name="Content Placeholder 2"/>
+          <p:cNvSpPr>
+            <a:spLocks noGrp="1"/>
+          </p:cNvSpPr>
+          <p:nvPr>
+            <p:ph idx="1"/>
+          </p:nvPr>
+        </p:nvSpPr>
+        <p:spPr>
+          <a:xfrm>
+            <a:off x="457200" y="1094346"/>
+            <a:ext cx="8229600" cy="5214974"/>
+          </a:xfrm>
+        </p:spPr>
+        <p:txBody>
+          <a:bodyPr>
+            <a:noAutofit/>
+          </a:bodyPr>
+          <a:lstStyle/>
+          <a:p>
+            <a:pPr lvl="0"/>
+            <a:r>
+              <a:rPr lang="en-GB" sz="2800" dirty="0">
+                <a:solidFill>
+                  <a:schemeClr val="tx1"/>
+                </a:solidFill>
+              </a:rPr>
+              <a:t>What countries have the highest earnings?</a:t>
+            </a:r>
+            <a:endParaRPr lang="pt-PT" sz="2800" dirty="0">
+              <a:solidFill>
+                <a:schemeClr val="tx1"/>
+              </a:solidFill>
+            </a:endParaRPr>
+          </a:p>
+          <a:p>
+            <a:r>
+              <a:rPr lang="en-GB" sz="2800" b="0" dirty="0">
+                <a:solidFill>
+                  <a:schemeClr val="tx1"/>
+                </a:solidFill>
+              </a:rPr>
+              <a:t>Group players by countries and get the sum of their earnings.</a:t>
+            </a:r>
+            <a:endParaRPr lang="pt-PT" sz="2800" b="0" dirty="0">
+              <a:solidFill>
+                <a:schemeClr val="tx1"/>
+              </a:solidFill>
+            </a:endParaRPr>
+          </a:p>
+          <a:p>
+            <a:pPr lvl="0"/>
+            <a:r>
+              <a:rPr lang="en-GB" sz="2800" dirty="0">
+                <a:solidFill>
+                  <a:schemeClr val="tx1"/>
+                </a:solidFill>
+              </a:rPr>
+              <a:t>What is the age at which players earn the most?</a:t>
+            </a:r>
+            <a:endParaRPr lang="pt-PT" sz="2800" dirty="0">
+              <a:solidFill>
+                <a:schemeClr val="tx1"/>
+              </a:solidFill>
+            </a:endParaRPr>
+          </a:p>
+          <a:p>
+            <a:r>
+              <a:rPr lang="en-GB" sz="2800" b="0" dirty="0">
+                <a:solidFill>
+                  <a:schemeClr val="tx1"/>
+                </a:solidFill>
+              </a:rPr>
+              <a:t>Compare each player’s earnings by age.</a:t>
+            </a:r>
+            <a:endParaRPr lang="pt-PT" sz="2800" b="0" dirty="0">
+              <a:solidFill>
+                <a:schemeClr val="tx1"/>
+              </a:solidFill>
+            </a:endParaRPr>
+          </a:p>
+          <a:p>
+            <a:pPr lvl="0"/>
+            <a:r>
+              <a:rPr lang="en-GB" sz="2800" dirty="0">
+                <a:solidFill>
+                  <a:schemeClr val="tx1"/>
+                </a:solidFill>
+              </a:rPr>
+              <a:t>What organizations earned the most?</a:t>
+            </a:r>
+            <a:endParaRPr lang="pt-PT" sz="2800" dirty="0">
+              <a:solidFill>
+                <a:schemeClr val="tx1"/>
+              </a:solidFill>
+            </a:endParaRPr>
+          </a:p>
+          <a:p>
+            <a:r>
+              <a:rPr lang="en-GB" sz="2800" b="0" dirty="0">
+                <a:solidFill>
+                  <a:schemeClr val="tx1"/>
+                </a:solidFill>
+              </a:rPr>
+              <a:t>Sort the teams table by earnings.</a:t>
+            </a:r>
+            <a:endParaRPr lang="pt-PT" sz="2800" b="0" dirty="0">
+              <a:solidFill>
+                <a:schemeClr val="tx1"/>
+              </a:solidFill>
+            </a:endParaRPr>
+          </a:p>
+        </p:txBody>
+      </p:sp>
+    </p:spTree>
+    <p:extLst>
+      <p:ext uri="{BB962C8B-B14F-4D97-AF65-F5344CB8AC3E}">
+        <p14:creationId xmlns:p14="http://schemas.microsoft.com/office/powerpoint/2010/main" val="2292396113"/>
+      </p:ext>
+    </p:extLst>
+  </p:cSld>
+  <p:clrMapOvr>
+    <a:masterClrMapping/>
+  </p:clrMapOvr>
+</p:sld>
+</file>
+
+<file path=ppt/slides/slide18.xml><?xml version="1.0" encoding="utf-8"?>
+<p:sld xmlns:a="http://schemas.openxmlformats.org/drawingml/2006/main" xmlns:r="http://schemas.openxmlformats.org/officeDocument/2006/relationships" xmlns:p="http://schemas.openxmlformats.org/presentationml/2006/main">
+  <p:cSld>
+    <p:spTree>
+      <p:nvGrpSpPr>
+        <p:cNvPr id="1" name=""/>
+        <p:cNvGrpSpPr/>
+        <p:nvPr/>
+      </p:nvGrpSpPr>
+      <p:grpSpPr>
+        <a:xfrm>
+          <a:off x="0" y="0"/>
+          <a:ext cx="0" cy="0"/>
+          <a:chOff x="0" y="0"/>
+          <a:chExt cx="0" cy="0"/>
+        </a:xfrm>
+      </p:grpSpPr>
+      <p:sp>
+        <p:nvSpPr>
           <p:cNvPr id="2" name="Title 1">
             <a:extLst>
               <a:ext uri="{FF2B5EF4-FFF2-40B4-BE49-F238E27FC236}">
@@ -5373,14 +5637,45 @@
           </a:p>
           <a:p>
             <a:r>
+              <a:rPr lang="en-GB" b="0" dirty="0">
+                <a:solidFill>
+                  <a:schemeClr val="tx1"/>
+                </a:solidFill>
+              </a:rPr>
+              <a:t>Use the dates from the tournaments table.</a:t>
+            </a:r>
+            <a:endParaRPr lang="pt-PT" b="0" dirty="0">
+              <a:solidFill>
+                <a:schemeClr val="tx1"/>
+              </a:solidFill>
+            </a:endParaRPr>
+          </a:p>
+          <a:p>
+            <a:pPr lvl="0"/>
+            <a:r>
               <a:rPr lang="en-GB" dirty="0">
                 <a:solidFill>
                   <a:schemeClr val="tx1"/>
                 </a:solidFill>
               </a:rPr>
-              <a:t>TBA</a:t>
+              <a:t>How does unemployment correlate with player earnings?</a:t>
             </a:r>
             <a:endParaRPr lang="pt-PT" dirty="0">
+              <a:solidFill>
+                <a:schemeClr val="tx1"/>
+              </a:solidFill>
+            </a:endParaRPr>
+          </a:p>
+          <a:p>
+            <a:r>
+              <a:rPr lang="en-GB" b="0" dirty="0">
+                <a:solidFill>
+                  <a:schemeClr val="tx1"/>
+                </a:solidFill>
+              </a:rPr>
+              <a:t>Use the data from country and player tables.</a:t>
+            </a:r>
+            <a:endParaRPr lang="pt-PT" b="0" dirty="0">
               <a:solidFill>
                 <a:schemeClr val="tx1"/>
               </a:solidFill>
@@ -5569,12 +5864,20 @@
           </a:p>
           <a:p>
             <a:r>
-              <a:rPr lang="en-GB" b="0" dirty="0">
-                <a:solidFill>
-                  <a:schemeClr val="tx1"/>
-                </a:solidFill>
-              </a:rPr>
-              <a:t>		</a:t>
+              <a:rPr lang="en-GB" b="0">
+                <a:solidFill>
+                  <a:schemeClr val="tx1"/>
+                </a:solidFill>
+              </a:rPr>
+              <a:t>	</a:t>
+            </a:r>
+            <a:r>
+              <a:rPr lang="en-GB" sz="2400" b="0">
+                <a:solidFill>
+                  <a:schemeClr val="tx1"/>
+                </a:solidFill>
+              </a:rPr>
+              <a:t>Static </a:t>
             </a:r>
             <a:r>
               <a:rPr lang="en-GB" sz="2400" b="0" dirty="0">
@@ -5582,7 +5885,7 @@
                   <a:schemeClr val="tx1"/>
                 </a:solidFill>
               </a:rPr>
-              <a:t>Static tables from esportsearnings.com and </a:t>
+              <a:t>tables from esportsearnings.com and </a:t>
             </a:r>
             <a:r>
               <a:rPr lang="en-GB" sz="2400" b="0" dirty="0" err="1">
@@ -5842,46 +6145,16 @@
           </a:p>
           <a:p>
             <a:r>
-              <a:rPr lang="en-GB" b="0" dirty="0">
-                <a:solidFill>
-                  <a:schemeClr val="tx1"/>
-                </a:solidFill>
-              </a:rPr>
-              <a:t>	We joined the players and </a:t>
-            </a:r>
-            <a:r>
-              <a:rPr lang="en-GB" b="0" dirty="0" err="1">
-                <a:solidFill>
-                  <a:schemeClr val="tx1"/>
-                </a:solidFill>
-              </a:rPr>
-              <a:t>earningsByAge</a:t>
-            </a:r>
-            <a:r>
-              <a:rPr lang="en-GB" b="0" dirty="0">
-                <a:solidFill>
-                  <a:schemeClr val="tx1"/>
-                </a:solidFill>
-              </a:rPr>
-              <a:t> tables by the </a:t>
-            </a:r>
-            <a:r>
-              <a:rPr lang="en-GB" b="0" dirty="0" err="1">
-                <a:solidFill>
-                  <a:schemeClr val="tx1"/>
-                </a:solidFill>
-              </a:rPr>
-              <a:t>playerId</a:t>
-            </a:r>
-            <a:r>
-              <a:rPr lang="en-GB" b="0" dirty="0">
-                <a:solidFill>
-                  <a:schemeClr val="tx1"/>
-                </a:solidFill>
-              </a:rPr>
-              <a:t> using Pentaho DI.</a:t>
-            </a:r>
-            <a:endParaRPr lang="pt-PT" b="0" dirty="0">
+              <a:rPr lang="en-GB" sz="2800" b="0" dirty="0">
+                <a:solidFill>
+                  <a:schemeClr val="tx1"/>
+                </a:solidFill>
+              </a:rPr>
+              <a:t>	</a:t>
+            </a:r>
+          </a:p>
+          <a:p>
+            <a:endParaRPr lang="en-GB" sz="2800" b="0" dirty="0">
               <a:solidFill>
                 <a:schemeClr val="tx1"/>
               </a:solidFill>
@@ -5889,24 +6162,37 @@
           </a:p>
           <a:p>
             <a:r>
-              <a:rPr lang="en-GB" b="0" dirty="0">
-                <a:solidFill>
-                  <a:schemeClr val="tx1"/>
-                </a:solidFill>
-              </a:rPr>
-              <a:t>	We left the rest of the data as we got it from the APIs.</a:t>
-            </a:r>
-            <a:endParaRPr lang="pt-PT" b="0" dirty="0">
-              <a:solidFill>
-                <a:schemeClr val="tx1"/>
-              </a:solidFill>
-            </a:endParaRPr>
-          </a:p>
-          <a:p>
-            <a:endParaRPr lang="en-US" sz="4000" dirty="0"/>
-          </a:p>
-          <a:p>
-            <a:pPr lvl="1"/>
+              <a:rPr lang="en-GB" sz="2800" b="0" dirty="0">
+                <a:solidFill>
+                  <a:schemeClr val="tx1"/>
+                </a:solidFill>
+              </a:rPr>
+              <a:t>	</a:t>
+            </a:r>
+            <a:r>
+              <a:rPr lang="en-US" sz="2800" b="0" dirty="0">
+                <a:solidFill>
+                  <a:schemeClr val="tx1"/>
+                </a:solidFill>
+              </a:rPr>
+              <a:t>We joined the players and </a:t>
+            </a:r>
+            <a:r>
+              <a:rPr lang="en-US" sz="2800" b="0" dirty="0" err="1">
+                <a:solidFill>
+                  <a:schemeClr val="tx1"/>
+                </a:solidFill>
+              </a:rPr>
+              <a:t>earningsByAge</a:t>
+            </a:r>
+            <a:r>
+              <a:rPr lang="en-US" sz="2800" b="0" dirty="0">
+                <a:solidFill>
+                  <a:schemeClr val="tx1"/>
+                </a:solidFill>
+              </a:rPr>
+              <a:t> tables using Pentaho DI.</a:t>
+            </a:r>
             <a:endParaRPr lang="en-US" dirty="0"/>
           </a:p>
         </p:txBody>
@@ -5987,23 +6273,28 @@
             </a:r>
           </a:p>
           <a:p>
-            <a:pPr lvl="1"/>
-            <a:r>
-              <a:rPr lang="en-US" sz="3600" dirty="0"/>
-              <a:t>Which measures?</a:t>
-            </a:r>
-          </a:p>
-          <a:p>
-            <a:pPr lvl="1"/>
-            <a:r>
-              <a:rPr lang="en-US" sz="3600" dirty="0"/>
-              <a:t>Why? </a:t>
-            </a:r>
-            <a:r>
-              <a:rPr lang="en-US" sz="3600" b="1" dirty="0"/>
-              <a:t>TBA</a:t>
-            </a:r>
-            <a:endParaRPr lang="en-US" sz="3600" dirty="0"/>
+            <a:r>
+              <a:rPr lang="en-US" sz="2800" b="0" dirty="0">
+                <a:solidFill>
+                  <a:schemeClr val="tx1"/>
+                </a:solidFill>
+              </a:rPr>
+              <a:t>	We removed some unnecessary attributes from the other tables (such as the location/name of tournaments).</a:t>
+            </a:r>
+          </a:p>
+          <a:p>
+            <a:r>
+              <a:rPr lang="en-US" dirty="0"/>
+              <a:t>	</a:t>
+            </a:r>
+            <a:r>
+              <a:rPr lang="en-US" sz="2800" b="0" dirty="0">
+                <a:solidFill>
+                  <a:schemeClr val="tx1"/>
+                </a:solidFill>
+              </a:rPr>
+              <a:t>Some players don’t have their earnings by age available, so when we’re using that part of the table they will be ignored.</a:t>
+            </a:r>
           </a:p>
           <a:p>
             <a:pPr lvl="1"/>

</xml_diff>

<commit_message>
This time its personal - PowerPoint final
</commit_message>
<xml_diff>
--- a/docs/Checkpoint II - Presentation.pptx
+++ b/docs/Checkpoint II - Presentation.pptx
@@ -294,7 +294,7 @@
           <a:p>
             <a:fld id="{C7B702CB-D988-47C5-8204-95032A6A7C26}" type="slidenum">
               <a:rPr lang="en-US" smtClean="0"/>
-              <a:t>‹#›</a:t>
+              <a:t>‹nº›</a:t>
             </a:fld>
             <a:endParaRPr lang="en-US"/>
           </a:p>
@@ -555,7 +555,7 @@
             <a:fld id="{F535F173-C1DD-4975-94BF-5B9ED67F7674}" type="slidenum">
               <a:rPr lang="en-US" smtClean="0"/>
               <a:pPr/>
-              <a:t>‹#›</a:t>
+              <a:t>‹nº›</a:t>
             </a:fld>
             <a:endParaRPr lang="en-US"/>
           </a:p>
@@ -2065,7 +2065,7 @@
             <a:fld id="{B5EBF8D4-C87A-47B7-9996-84452461937B}" type="slidenum">
               <a:rPr lang="pt-PT" smtClean="0"/>
               <a:pPr/>
-              <a:t>‹#›</a:t>
+              <a:t>‹nº›</a:t>
             </a:fld>
             <a:endParaRPr lang="pt-PT"/>
           </a:p>
@@ -4250,6 +4250,114 @@
           </a:p>
         </p:txBody>
       </p:sp>
+      <p:pic>
+        <p:nvPicPr>
+          <p:cNvPr id="5" name="Imagem 4">
+            <a:extLst>
+              <a:ext uri="{FF2B5EF4-FFF2-40B4-BE49-F238E27FC236}">
+                <a16:creationId xmlns:a16="http://schemas.microsoft.com/office/drawing/2014/main" id="{A14E574D-3EA3-4466-A866-8C8D3FA7D4CC}"/>
+              </a:ext>
+            </a:extLst>
+          </p:cNvPr>
+          <p:cNvPicPr>
+            <a:picLocks noChangeAspect="1"/>
+          </p:cNvPicPr>
+          <p:nvPr/>
+        </p:nvPicPr>
+        <p:blipFill>
+          <a:blip r:embed="rId3">
+            <a:extLst>
+              <a:ext uri="{28A0092B-C50C-407E-A947-70E740481C1C}">
+                <a14:useLocalDpi xmlns:a14="http://schemas.microsoft.com/office/drawing/2010/main" val="0"/>
+              </a:ext>
+            </a:extLst>
+          </a:blip>
+          <a:stretch>
+            <a:fillRect/>
+          </a:stretch>
+        </p:blipFill>
+        <p:spPr>
+          <a:xfrm>
+            <a:off x="6907631" y="5051413"/>
+            <a:ext cx="1424482" cy="1424482"/>
+          </a:xfrm>
+          <a:prstGeom prst="rect">
+            <a:avLst/>
+          </a:prstGeom>
+        </p:spPr>
+      </p:pic>
+      <p:pic>
+        <p:nvPicPr>
+          <p:cNvPr id="7" name="Imagem 6">
+            <a:extLst>
+              <a:ext uri="{FF2B5EF4-FFF2-40B4-BE49-F238E27FC236}">
+                <a16:creationId xmlns:a16="http://schemas.microsoft.com/office/drawing/2014/main" id="{A8B103C6-E38C-461F-82D1-20A8B6699DC9}"/>
+              </a:ext>
+            </a:extLst>
+          </p:cNvPr>
+          <p:cNvPicPr>
+            <a:picLocks noChangeAspect="1"/>
+          </p:cNvPicPr>
+          <p:nvPr/>
+        </p:nvPicPr>
+        <p:blipFill>
+          <a:blip r:embed="rId4">
+            <a:extLst>
+              <a:ext uri="{28A0092B-C50C-407E-A947-70E740481C1C}">
+                <a14:useLocalDpi xmlns:a14="http://schemas.microsoft.com/office/drawing/2010/main" val="0"/>
+              </a:ext>
+            </a:extLst>
+          </a:blip>
+          <a:stretch>
+            <a:fillRect/>
+          </a:stretch>
+        </p:blipFill>
+        <p:spPr>
+          <a:xfrm>
+            <a:off x="3903611" y="4855638"/>
+            <a:ext cx="1484514" cy="1484514"/>
+          </a:xfrm>
+          <a:prstGeom prst="rect">
+            <a:avLst/>
+          </a:prstGeom>
+        </p:spPr>
+      </p:pic>
+      <p:pic>
+        <p:nvPicPr>
+          <p:cNvPr id="9" name="Imagem 8">
+            <a:extLst>
+              <a:ext uri="{FF2B5EF4-FFF2-40B4-BE49-F238E27FC236}">
+                <a16:creationId xmlns:a16="http://schemas.microsoft.com/office/drawing/2014/main" id="{1DC3963D-0544-486F-A858-82D42998AF59}"/>
+              </a:ext>
+            </a:extLst>
+          </p:cNvPr>
+          <p:cNvPicPr>
+            <a:picLocks noChangeAspect="1"/>
+          </p:cNvPicPr>
+          <p:nvPr/>
+        </p:nvPicPr>
+        <p:blipFill>
+          <a:blip r:embed="rId5" cstate="print">
+            <a:extLst>
+              <a:ext uri="{28A0092B-C50C-407E-A947-70E740481C1C}">
+                <a14:useLocalDpi xmlns:a14="http://schemas.microsoft.com/office/drawing/2010/main" val="0"/>
+              </a:ext>
+            </a:extLst>
+          </a:blip>
+          <a:stretch>
+            <a:fillRect/>
+          </a:stretch>
+        </p:blipFill>
+        <p:spPr>
+          <a:xfrm>
+            <a:off x="1115616" y="5079216"/>
+            <a:ext cx="1268489" cy="1467218"/>
+          </a:xfrm>
+          <a:prstGeom prst="rect">
+            <a:avLst/>
+          </a:prstGeom>
+        </p:spPr>
+      </p:pic>
     </p:spTree>
     <p:extLst>
       <p:ext uri="{BB962C8B-B14F-4D97-AF65-F5344CB8AC3E}">
@@ -5119,6 +5227,114 @@
           </a:p>
         </p:txBody>
       </p:sp>
+      <p:pic>
+        <p:nvPicPr>
+          <p:cNvPr id="5" name="Imagem 4">
+            <a:extLst>
+              <a:ext uri="{FF2B5EF4-FFF2-40B4-BE49-F238E27FC236}">
+                <a16:creationId xmlns:a16="http://schemas.microsoft.com/office/drawing/2014/main" id="{7E72F6E3-861E-4CB2-9949-0605A69E2A56}"/>
+              </a:ext>
+            </a:extLst>
+          </p:cNvPr>
+          <p:cNvPicPr>
+            <a:picLocks noChangeAspect="1"/>
+          </p:cNvPicPr>
+          <p:nvPr/>
+        </p:nvPicPr>
+        <p:blipFill>
+          <a:blip r:embed="rId3" cstate="print">
+            <a:extLst>
+              <a:ext uri="{28A0092B-C50C-407E-A947-70E740481C1C}">
+                <a14:useLocalDpi xmlns:a14="http://schemas.microsoft.com/office/drawing/2010/main" val="0"/>
+              </a:ext>
+            </a:extLst>
+          </a:blip>
+          <a:stretch>
+            <a:fillRect/>
+          </a:stretch>
+        </p:blipFill>
+        <p:spPr>
+          <a:xfrm>
+            <a:off x="6732240" y="5525827"/>
+            <a:ext cx="2133997" cy="1020607"/>
+          </a:xfrm>
+          <a:prstGeom prst="rect">
+            <a:avLst/>
+          </a:prstGeom>
+        </p:spPr>
+      </p:pic>
+      <p:pic>
+        <p:nvPicPr>
+          <p:cNvPr id="7" name="Imagem 6">
+            <a:extLst>
+              <a:ext uri="{FF2B5EF4-FFF2-40B4-BE49-F238E27FC236}">
+                <a16:creationId xmlns:a16="http://schemas.microsoft.com/office/drawing/2014/main" id="{BD2EE114-95F1-43FB-B7F6-E7A94B0306D9}"/>
+              </a:ext>
+            </a:extLst>
+          </p:cNvPr>
+          <p:cNvPicPr>
+            <a:picLocks noChangeAspect="1"/>
+          </p:cNvPicPr>
+          <p:nvPr/>
+        </p:nvPicPr>
+        <p:blipFill>
+          <a:blip r:embed="rId4" cstate="print">
+            <a:extLst>
+              <a:ext uri="{28A0092B-C50C-407E-A947-70E740481C1C}">
+                <a14:useLocalDpi xmlns:a14="http://schemas.microsoft.com/office/drawing/2010/main" val="0"/>
+              </a:ext>
+            </a:extLst>
+          </a:blip>
+          <a:stretch>
+            <a:fillRect/>
+          </a:stretch>
+        </p:blipFill>
+        <p:spPr>
+          <a:xfrm>
+            <a:off x="2709648" y="5082461"/>
+            <a:ext cx="1862336" cy="1862336"/>
+          </a:xfrm>
+          <a:prstGeom prst="rect">
+            <a:avLst/>
+          </a:prstGeom>
+        </p:spPr>
+      </p:pic>
+      <p:pic>
+        <p:nvPicPr>
+          <p:cNvPr id="9" name="Imagem 8">
+            <a:extLst>
+              <a:ext uri="{FF2B5EF4-FFF2-40B4-BE49-F238E27FC236}">
+                <a16:creationId xmlns:a16="http://schemas.microsoft.com/office/drawing/2014/main" id="{95BE73B9-B00C-48A5-9F79-4B53681ED65F}"/>
+              </a:ext>
+            </a:extLst>
+          </p:cNvPr>
+          <p:cNvPicPr>
+            <a:picLocks noChangeAspect="1"/>
+          </p:cNvPicPr>
+          <p:nvPr/>
+        </p:nvPicPr>
+        <p:blipFill>
+          <a:blip r:embed="rId5">
+            <a:extLst>
+              <a:ext uri="{28A0092B-C50C-407E-A947-70E740481C1C}">
+                <a14:useLocalDpi xmlns:a14="http://schemas.microsoft.com/office/drawing/2010/main" val="0"/>
+              </a:ext>
+            </a:extLst>
+          </a:blip>
+          <a:stretch>
+            <a:fillRect/>
+          </a:stretch>
+        </p:blipFill>
+        <p:spPr>
+          <a:xfrm>
+            <a:off x="4788024" y="5303709"/>
+            <a:ext cx="1419841" cy="1419841"/>
+          </a:xfrm>
+          <a:prstGeom prst="rect">
+            <a:avLst/>
+          </a:prstGeom>
+        </p:spPr>
+      </p:pic>
     </p:spTree>
     <p:extLst>
       <p:ext uri="{BB962C8B-B14F-4D97-AF65-F5344CB8AC3E}">
@@ -5200,35 +5416,51 @@
             </a:r>
           </a:p>
           <a:p>
-            <a:pPr lvl="1"/>
+            <a:pPr marL="800100" lvl="1" indent="-342900">
+              <a:buFont typeface="Arial" panose="020B0604020202020204" pitchFamily="34" charset="0"/>
+              <a:buChar char="•"/>
+            </a:pPr>
             <a:r>
               <a:rPr lang="en-US" sz="2400" dirty="0"/>
-              <a:t>Problem: Players’ earnings by age weren’t available in the API</a:t>
-            </a:r>
-          </a:p>
-          <a:p>
-            <a:pPr lvl="1"/>
+              <a:t>Players’ earnings by age weren’t available in the API</a:t>
+            </a:r>
+          </a:p>
+          <a:p>
+            <a:pPr marL="800100" lvl="1" indent="-342900">
+              <a:buFont typeface="Arial" panose="020B0604020202020204" pitchFamily="34" charset="0"/>
+              <a:buChar char="•"/>
+            </a:pPr>
             <a:r>
               <a:rPr lang="en-US" sz="2400" dirty="0"/>
-              <a:t>Solution: Scraping each players page to get the data, since it’s available in plaintext.</a:t>
-            </a:r>
-          </a:p>
-          <a:p>
-            <a:pPr lvl="1"/>
+              <a:t>The API only let us get 100 players/tournaments/teams and 1 game at a time, with a maximum of 1 query every 2 seconds.</a:t>
+            </a:r>
+          </a:p>
+          <a:p>
+            <a:pPr lvl="0"/>
+            <a:r>
+              <a:rPr lang="en-US" sz="4000" dirty="0"/>
+              <a:t>Solutions found:</a:t>
+            </a:r>
             <a:endParaRPr lang="en-US" sz="2400" dirty="0"/>
           </a:p>
           <a:p>
-            <a:pPr lvl="1"/>
+            <a:pPr marL="800100" lvl="1" indent="-342900">
+              <a:buFont typeface="Arial" panose="020B0604020202020204" pitchFamily="34" charset="0"/>
+              <a:buChar char="•"/>
+            </a:pPr>
             <a:r>
               <a:rPr lang="en-US" sz="2400" dirty="0"/>
-              <a:t>Problem: The API only let us get 100 players/tournaments/teams and 1 game at a time, with a maximum of 1 query every 2 seconds.</a:t>
-            </a:r>
-          </a:p>
-          <a:p>
-            <a:pPr lvl="1"/>
+              <a:t>Scraping each players page to get the data, since it’s available in plaintext.</a:t>
+            </a:r>
+          </a:p>
+          <a:p>
+            <a:pPr marL="800100" lvl="1" indent="-342900">
+              <a:buFont typeface="Arial" panose="020B0604020202020204" pitchFamily="34" charset="0"/>
+              <a:buChar char="•"/>
+            </a:pPr>
             <a:r>
               <a:rPr lang="en-US" sz="2400" dirty="0"/>
-              <a:t>Solution: Writing a script for automating data collection.</a:t>
+              <a:t>Writing scripts for automating data collection.</a:t>
             </a:r>
           </a:p>
         </p:txBody>
@@ -5432,14 +5664,14 @@
           </a:p>
           <a:p>
             <a:r>
-              <a:rPr lang="en-GB" sz="2800" b="0" dirty="0">
+              <a:rPr lang="en-GB" sz="2400" b="0" dirty="0">
                 <a:solidFill>
                   <a:schemeClr val="tx1"/>
                 </a:solidFill>
               </a:rPr>
               <a:t>Group players by countries and get the sum of their earnings.</a:t>
             </a:r>
-            <a:endParaRPr lang="pt-PT" sz="2800" b="0" dirty="0">
+            <a:endParaRPr lang="pt-PT" sz="2400" b="0" dirty="0">
               <a:solidFill>
                 <a:schemeClr val="tx1"/>
               </a:solidFill>
@@ -5463,14 +5695,14 @@
           </a:p>
           <a:p>
             <a:r>
-              <a:rPr lang="en-GB" sz="2800" b="0" dirty="0">
+              <a:rPr lang="en-GB" sz="2400" b="0" dirty="0">
                 <a:solidFill>
                   <a:schemeClr val="tx1"/>
                 </a:solidFill>
               </a:rPr>
               <a:t>Compare each player’s earnings by age.</a:t>
             </a:r>
-            <a:endParaRPr lang="pt-PT" sz="2800" b="0" dirty="0">
+            <a:endParaRPr lang="pt-PT" sz="2400" b="0" dirty="0">
               <a:solidFill>
                 <a:schemeClr val="tx1"/>
               </a:solidFill>
@@ -5494,14 +5726,14 @@
           </a:p>
           <a:p>
             <a:r>
-              <a:rPr lang="en-GB" sz="2800" b="0" dirty="0">
+              <a:rPr lang="en-GB" sz="2400" b="0" dirty="0">
                 <a:solidFill>
                   <a:schemeClr val="tx1"/>
                 </a:solidFill>
               </a:rPr>
               <a:t>Sort the teams table by earnings.</a:t>
             </a:r>
-            <a:endParaRPr lang="pt-PT" sz="2800" b="0" dirty="0">
+            <a:endParaRPr lang="pt-PT" sz="2400" b="0" dirty="0">
               <a:solidFill>
                 <a:schemeClr val="tx1"/>
               </a:solidFill>
@@ -5584,21 +5816,26 @@
             <p:ph idx="1"/>
           </p:nvPr>
         </p:nvSpPr>
-        <p:spPr/>
+        <p:spPr>
+          <a:xfrm>
+            <a:off x="457200" y="1285860"/>
+            <a:ext cx="8686800" cy="5214974"/>
+          </a:xfrm>
+        </p:spPr>
         <p:txBody>
           <a:bodyPr/>
           <a:lstStyle/>
           <a:p>
             <a:pPr lvl="0"/>
             <a:r>
-              <a:rPr lang="en-GB" dirty="0">
+              <a:rPr lang="en-GB" sz="2800" dirty="0">
                 <a:solidFill>
                   <a:schemeClr val="tx1"/>
                 </a:solidFill>
               </a:rPr>
               <a:t>What games have the most earnings?</a:t>
             </a:r>
-            <a:endParaRPr lang="pt-PT" dirty="0">
+            <a:endParaRPr lang="pt-PT" sz="2800" dirty="0">
               <a:solidFill>
                 <a:schemeClr val="tx1"/>
               </a:solidFill>
@@ -5606,14 +5843,14 @@
           </a:p>
           <a:p>
             <a:r>
-              <a:rPr lang="en-GB" b="0" dirty="0">
+              <a:rPr lang="en-GB" sz="2400" b="0" dirty="0">
                 <a:solidFill>
                   <a:schemeClr val="tx1"/>
                 </a:solidFill>
               </a:rPr>
               <a:t>Sort the games table by earnings.</a:t>
             </a:r>
-            <a:endParaRPr lang="pt-PT" b="0" dirty="0">
+            <a:endParaRPr lang="pt-PT" sz="2400" b="0" dirty="0">
               <a:solidFill>
                 <a:schemeClr val="tx1"/>
               </a:solidFill>
@@ -5622,14 +5859,14 @@
           <a:p>
             <a:pPr lvl="0"/>
             <a:r>
-              <a:rPr lang="en-GB" dirty="0">
+              <a:rPr lang="en-GB" sz="2800" dirty="0">
                 <a:solidFill>
                   <a:schemeClr val="tx1"/>
                 </a:solidFill>
               </a:rPr>
               <a:t>What months are the most active in esports?</a:t>
             </a:r>
-            <a:endParaRPr lang="pt-PT" dirty="0">
+            <a:endParaRPr lang="pt-PT" sz="2800" dirty="0">
               <a:solidFill>
                 <a:schemeClr val="tx1"/>
               </a:solidFill>
@@ -5637,14 +5874,14 @@
           </a:p>
           <a:p>
             <a:r>
-              <a:rPr lang="en-GB" b="0" dirty="0">
+              <a:rPr lang="en-GB" sz="2400" b="0" dirty="0">
                 <a:solidFill>
                   <a:schemeClr val="tx1"/>
                 </a:solidFill>
               </a:rPr>
               <a:t>Use the dates from the tournaments table.</a:t>
             </a:r>
-            <a:endParaRPr lang="pt-PT" b="0" dirty="0">
+            <a:endParaRPr lang="pt-PT" sz="2400" b="0" dirty="0">
               <a:solidFill>
                 <a:schemeClr val="tx1"/>
               </a:solidFill>
@@ -5653,14 +5890,14 @@
           <a:p>
             <a:pPr lvl="0"/>
             <a:r>
-              <a:rPr lang="en-GB" dirty="0">
+              <a:rPr lang="en-GB" sz="2800" dirty="0">
                 <a:solidFill>
                   <a:schemeClr val="tx1"/>
                 </a:solidFill>
               </a:rPr>
               <a:t>How does unemployment correlate with player earnings?</a:t>
             </a:r>
-            <a:endParaRPr lang="pt-PT" dirty="0">
+            <a:endParaRPr lang="pt-PT" sz="2800" dirty="0">
               <a:solidFill>
                 <a:schemeClr val="tx1"/>
               </a:solidFill>
@@ -5668,14 +5905,14 @@
           </a:p>
           <a:p>
             <a:r>
-              <a:rPr lang="en-GB" b="0" dirty="0">
+              <a:rPr lang="en-GB" sz="2400" b="0" dirty="0">
                 <a:solidFill>
                   <a:schemeClr val="tx1"/>
                 </a:solidFill>
               </a:rPr>
               <a:t>Use the data from country and player tables.</a:t>
             </a:r>
-            <a:endParaRPr lang="pt-PT" b="0" dirty="0">
+            <a:endParaRPr lang="pt-PT" sz="2400" b="0" dirty="0">
               <a:solidFill>
                 <a:schemeClr val="tx1"/>
               </a:solidFill>
@@ -5864,28 +6101,12 @@
           </a:p>
           <a:p>
             <a:r>
-              <a:rPr lang="en-GB" b="0">
-                <a:solidFill>
-                  <a:schemeClr val="tx1"/>
-                </a:solidFill>
-              </a:rPr>
-              <a:t>	</a:t>
-            </a:r>
-            <a:r>
-              <a:rPr lang="en-GB" sz="2400" b="0">
-                <a:solidFill>
-                  <a:schemeClr val="tx1"/>
-                </a:solidFill>
-              </a:rPr>
-              <a:t>Static </a:t>
-            </a:r>
-            <a:r>
               <a:rPr lang="en-GB" sz="2400" b="0" dirty="0">
                 <a:solidFill>
                   <a:schemeClr val="tx1"/>
                 </a:solidFill>
               </a:rPr>
-              <a:t>tables from esportsearnings.com and </a:t>
+              <a:t>	Static tables from esportsearnings.com and </a:t>
             </a:r>
             <a:r>
               <a:rPr lang="en-GB" sz="2400" b="0" dirty="0" err="1">
@@ -5922,10 +6143,10 @@
       </p:sp>
       <p:pic>
         <p:nvPicPr>
-          <p:cNvPr id="4" name="Picture 3">
+          <p:cNvPr id="5" name="Imagem 4">
             <a:extLst>
               <a:ext uri="{FF2B5EF4-FFF2-40B4-BE49-F238E27FC236}">
-                <a16:creationId xmlns:a16="http://schemas.microsoft.com/office/drawing/2014/main" id="{D1A3623B-A51A-4383-8E6B-ED880CC444E0}"/>
+                <a16:creationId xmlns:a16="http://schemas.microsoft.com/office/drawing/2014/main" id="{AD26DB7D-45B6-47E4-9066-4FA39CA9F027}"/>
               </a:ext>
             </a:extLst>
           </p:cNvPr>
@@ -5942,8 +6163,8 @@
         </p:blipFill>
         <p:spPr>
           <a:xfrm>
-            <a:off x="683568" y="3645024"/>
-            <a:ext cx="7380312" cy="3054880"/>
+            <a:off x="1458194" y="3436456"/>
+            <a:ext cx="6227611" cy="3528392"/>
           </a:xfrm>
           <a:prstGeom prst="rect">
             <a:avLst/>
@@ -6142,18 +6363,6 @@
               <a:rPr lang="en-US" sz="4000" dirty="0"/>
               <a:t>Data description</a:t>
             </a:r>
-          </a:p>
-          <a:p>
-            <a:r>
-              <a:rPr lang="en-GB" sz="2800" b="0" dirty="0">
-                <a:solidFill>
-                  <a:schemeClr val="tx1"/>
-                </a:solidFill>
-              </a:rPr>
-              <a:t>	</a:t>
-            </a:r>
-          </a:p>
-          <a:p>
             <a:endParaRPr lang="en-GB" sz="2800" b="0" dirty="0">
               <a:solidFill>
                 <a:schemeClr val="tx1"/>
@@ -6175,25 +6384,215 @@
                   <a:schemeClr val="tx1"/>
                 </a:solidFill>
               </a:rPr>
-              <a:t>We joined the players and </a:t>
-            </a:r>
-            <a:r>
-              <a:rPr lang="en-US" sz="2800" b="0" dirty="0" err="1">
-                <a:solidFill>
-                  <a:schemeClr val="tx1"/>
-                </a:solidFill>
-              </a:rPr>
-              <a:t>earningsByAge</a:t>
-            </a:r>
-            <a:r>
-              <a:rPr lang="en-US" sz="2800" b="0" dirty="0">
-                <a:solidFill>
-                  <a:schemeClr val="tx1"/>
-                </a:solidFill>
-              </a:rPr>
-              <a:t> tables using Pentaho DI.</a:t>
+              <a:t>Our data gives us the ability to correlate several key aspects from esports such as earnings from players and tournaments or the unemployment rating of countries with the players that earn the most.</a:t>
             </a:r>
             <a:endParaRPr lang="en-US" dirty="0"/>
+          </a:p>
+        </p:txBody>
+      </p:sp>
+      <p:pic>
+        <p:nvPicPr>
+          <p:cNvPr id="5" name="Imagem 4">
+            <a:extLst>
+              <a:ext uri="{FF2B5EF4-FFF2-40B4-BE49-F238E27FC236}">
+                <a16:creationId xmlns:a16="http://schemas.microsoft.com/office/drawing/2014/main" id="{8B18FC7F-C7F1-4337-A1AA-66DFDC91723D}"/>
+              </a:ext>
+            </a:extLst>
+          </p:cNvPr>
+          <p:cNvPicPr>
+            <a:picLocks noChangeAspect="1"/>
+          </p:cNvPicPr>
+          <p:nvPr/>
+        </p:nvPicPr>
+        <p:blipFill>
+          <a:blip r:embed="rId3" cstate="print">
+            <a:extLst>
+              <a:ext uri="{28A0092B-C50C-407E-A947-70E740481C1C}">
+                <a14:useLocalDpi xmlns:a14="http://schemas.microsoft.com/office/drawing/2010/main" val="0"/>
+              </a:ext>
+            </a:extLst>
+          </a:blip>
+          <a:stretch>
+            <a:fillRect/>
+          </a:stretch>
+        </p:blipFill>
+        <p:spPr>
+          <a:xfrm>
+            <a:off x="745096" y="4456402"/>
+            <a:ext cx="1493463" cy="1893319"/>
+          </a:xfrm>
+          <a:prstGeom prst="rect">
+            <a:avLst/>
+          </a:prstGeom>
+        </p:spPr>
+      </p:pic>
+      <p:pic>
+        <p:nvPicPr>
+          <p:cNvPr id="7" name="Imagem 6">
+            <a:extLst>
+              <a:ext uri="{FF2B5EF4-FFF2-40B4-BE49-F238E27FC236}">
+                <a16:creationId xmlns:a16="http://schemas.microsoft.com/office/drawing/2014/main" id="{0D23607D-91E3-4C8E-AEDF-9BDFC9913794}"/>
+              </a:ext>
+            </a:extLst>
+          </p:cNvPr>
+          <p:cNvPicPr>
+            <a:picLocks noChangeAspect="1"/>
+          </p:cNvPicPr>
+          <p:nvPr/>
+        </p:nvPicPr>
+        <p:blipFill>
+          <a:blip r:embed="rId4" cstate="print">
+            <a:extLst>
+              <a:ext uri="{28A0092B-C50C-407E-A947-70E740481C1C}">
+                <a14:useLocalDpi xmlns:a14="http://schemas.microsoft.com/office/drawing/2010/main" val="0"/>
+              </a:ext>
+            </a:extLst>
+          </a:blip>
+          <a:stretch>
+            <a:fillRect/>
+          </a:stretch>
+        </p:blipFill>
+        <p:spPr>
+          <a:xfrm>
+            <a:off x="3520944" y="4631181"/>
+            <a:ext cx="1208831" cy="1543756"/>
+          </a:xfrm>
+          <a:prstGeom prst="rect">
+            <a:avLst/>
+          </a:prstGeom>
+        </p:spPr>
+      </p:pic>
+      <p:pic>
+        <p:nvPicPr>
+          <p:cNvPr id="9" name="Imagem 8">
+            <a:extLst>
+              <a:ext uri="{FF2B5EF4-FFF2-40B4-BE49-F238E27FC236}">
+                <a16:creationId xmlns:a16="http://schemas.microsoft.com/office/drawing/2014/main" id="{362053E0-0AB5-4B6C-BD3F-AFFC1D4F4513}"/>
+              </a:ext>
+            </a:extLst>
+          </p:cNvPr>
+          <p:cNvPicPr>
+            <a:picLocks noChangeAspect="1"/>
+          </p:cNvPicPr>
+          <p:nvPr/>
+        </p:nvPicPr>
+        <p:blipFill>
+          <a:blip r:embed="rId5">
+            <a:extLst>
+              <a:ext uri="{28A0092B-C50C-407E-A947-70E740481C1C}">
+                <a14:useLocalDpi xmlns:a14="http://schemas.microsoft.com/office/drawing/2010/main" val="0"/>
+              </a:ext>
+            </a:extLst>
+          </a:blip>
+          <a:stretch>
+            <a:fillRect/>
+          </a:stretch>
+        </p:blipFill>
+        <p:spPr>
+          <a:xfrm>
+            <a:off x="6012160" y="4834902"/>
+            <a:ext cx="2602805" cy="1136315"/>
+          </a:xfrm>
+          <a:prstGeom prst="rect">
+            <a:avLst/>
+          </a:prstGeom>
+        </p:spPr>
+      </p:pic>
+      <p:sp>
+        <p:nvSpPr>
+          <p:cNvPr id="10" name="Seta: Para a Direita 9">
+            <a:extLst>
+              <a:ext uri="{FF2B5EF4-FFF2-40B4-BE49-F238E27FC236}">
+                <a16:creationId xmlns:a16="http://schemas.microsoft.com/office/drawing/2014/main" id="{E61B6B3B-D517-4830-8A4C-29CF49EF1A47}"/>
+              </a:ext>
+            </a:extLst>
+          </p:cNvPr>
+          <p:cNvSpPr/>
+          <p:nvPr/>
+        </p:nvSpPr>
+        <p:spPr>
+          <a:xfrm rot="10800000">
+            <a:off x="2524454" y="5254650"/>
+            <a:ext cx="648072" cy="169081"/>
+          </a:xfrm>
+          <a:prstGeom prst="rightArrow">
+            <a:avLst/>
+          </a:prstGeom>
+          <a:solidFill>
+            <a:srgbClr val="336699"/>
+          </a:solidFill>
+        </p:spPr>
+        <p:style>
+          <a:lnRef idx="2">
+            <a:schemeClr val="accent1">
+              <a:shade val="50000"/>
+            </a:schemeClr>
+          </a:lnRef>
+          <a:fillRef idx="1">
+            <a:schemeClr val="accent1"/>
+          </a:fillRef>
+          <a:effectRef idx="0">
+            <a:schemeClr val="accent1"/>
+          </a:effectRef>
+          <a:fontRef idx="minor">
+            <a:schemeClr val="lt1"/>
+          </a:fontRef>
+        </p:style>
+        <p:txBody>
+          <a:bodyPr rtlCol="0" anchor="ctr"/>
+          <a:lstStyle/>
+          <a:p>
+            <a:pPr algn="ctr"/>
+            <a:endParaRPr lang="en-US"/>
+          </a:p>
+        </p:txBody>
+      </p:sp>
+      <p:sp>
+        <p:nvSpPr>
+          <p:cNvPr id="11" name="Seta: Para a Direita 10">
+            <a:extLst>
+              <a:ext uri="{FF2B5EF4-FFF2-40B4-BE49-F238E27FC236}">
+                <a16:creationId xmlns:a16="http://schemas.microsoft.com/office/drawing/2014/main" id="{BA1331BF-D335-4238-8B10-38778D4AE32D}"/>
+              </a:ext>
+            </a:extLst>
+          </p:cNvPr>
+          <p:cNvSpPr/>
+          <p:nvPr/>
+        </p:nvSpPr>
+        <p:spPr>
+          <a:xfrm rot="10800000">
+            <a:off x="5052110" y="5276521"/>
+            <a:ext cx="648072" cy="169081"/>
+          </a:xfrm>
+          <a:prstGeom prst="rightArrow">
+            <a:avLst/>
+          </a:prstGeom>
+          <a:solidFill>
+            <a:srgbClr val="336699"/>
+          </a:solidFill>
+        </p:spPr>
+        <p:style>
+          <a:lnRef idx="2">
+            <a:schemeClr val="accent1">
+              <a:shade val="50000"/>
+            </a:schemeClr>
+          </a:lnRef>
+          <a:fillRef idx="1">
+            <a:schemeClr val="accent1"/>
+          </a:fillRef>
+          <a:effectRef idx="0">
+            <a:schemeClr val="accent1"/>
+          </a:effectRef>
+          <a:fontRef idx="minor">
+            <a:schemeClr val="lt1"/>
+          </a:fontRef>
+        </p:style>
+        <p:txBody>
+          <a:bodyPr rtlCol="0" anchor="ctr"/>
+          <a:lstStyle/>
+          <a:p>
+            <a:pPr algn="ctr"/>
+            <a:endParaRPr lang="en-US"/>
           </a:p>
         </p:txBody>
       </p:sp>
@@ -6984,6 +7383,114 @@
           </a:p>
         </p:txBody>
       </p:sp>
+      <p:pic>
+        <p:nvPicPr>
+          <p:cNvPr id="5" name="Imagem 4">
+            <a:extLst>
+              <a:ext uri="{FF2B5EF4-FFF2-40B4-BE49-F238E27FC236}">
+                <a16:creationId xmlns:a16="http://schemas.microsoft.com/office/drawing/2014/main" id="{B48823DB-CB5E-4A29-B6FF-4E58A3B8A725}"/>
+              </a:ext>
+            </a:extLst>
+          </p:cNvPr>
+          <p:cNvPicPr>
+            <a:picLocks noChangeAspect="1"/>
+          </p:cNvPicPr>
+          <p:nvPr/>
+        </p:nvPicPr>
+        <p:blipFill>
+          <a:blip r:embed="rId3" cstate="print">
+            <a:extLst>
+              <a:ext uri="{28A0092B-C50C-407E-A947-70E740481C1C}">
+                <a14:useLocalDpi xmlns:a14="http://schemas.microsoft.com/office/drawing/2010/main" val="0"/>
+              </a:ext>
+            </a:extLst>
+          </a:blip>
+          <a:stretch>
+            <a:fillRect/>
+          </a:stretch>
+        </p:blipFill>
+        <p:spPr>
+          <a:xfrm>
+            <a:off x="683568" y="5196034"/>
+            <a:ext cx="2339752" cy="1316111"/>
+          </a:xfrm>
+          <a:prstGeom prst="rect">
+            <a:avLst/>
+          </a:prstGeom>
+        </p:spPr>
+      </p:pic>
+      <p:pic>
+        <p:nvPicPr>
+          <p:cNvPr id="7" name="Imagem 6">
+            <a:extLst>
+              <a:ext uri="{FF2B5EF4-FFF2-40B4-BE49-F238E27FC236}">
+                <a16:creationId xmlns:a16="http://schemas.microsoft.com/office/drawing/2014/main" id="{6E28CDB0-B702-426F-9B5D-939D9F894944}"/>
+              </a:ext>
+            </a:extLst>
+          </p:cNvPr>
+          <p:cNvPicPr>
+            <a:picLocks noChangeAspect="1"/>
+          </p:cNvPicPr>
+          <p:nvPr/>
+        </p:nvPicPr>
+        <p:blipFill>
+          <a:blip r:embed="rId4">
+            <a:extLst>
+              <a:ext uri="{28A0092B-C50C-407E-A947-70E740481C1C}">
+                <a14:useLocalDpi xmlns:a14="http://schemas.microsoft.com/office/drawing/2010/main" val="0"/>
+              </a:ext>
+            </a:extLst>
+          </a:blip>
+          <a:stretch>
+            <a:fillRect/>
+          </a:stretch>
+        </p:blipFill>
+        <p:spPr>
+          <a:xfrm>
+            <a:off x="3347864" y="5204100"/>
+            <a:ext cx="2837334" cy="1119108"/>
+          </a:xfrm>
+          <a:prstGeom prst="rect">
+            <a:avLst/>
+          </a:prstGeom>
+        </p:spPr>
+      </p:pic>
+      <p:pic>
+        <p:nvPicPr>
+          <p:cNvPr id="9" name="Imagem 8">
+            <a:extLst>
+              <a:ext uri="{FF2B5EF4-FFF2-40B4-BE49-F238E27FC236}">
+                <a16:creationId xmlns:a16="http://schemas.microsoft.com/office/drawing/2014/main" id="{F6378BAE-FB4E-4D62-AABE-B3C00EA1C833}"/>
+              </a:ext>
+            </a:extLst>
+          </p:cNvPr>
+          <p:cNvPicPr>
+            <a:picLocks noChangeAspect="1"/>
+          </p:cNvPicPr>
+          <p:nvPr/>
+        </p:nvPicPr>
+        <p:blipFill>
+          <a:blip r:embed="rId5" cstate="print">
+            <a:extLst>
+              <a:ext uri="{28A0092B-C50C-407E-A947-70E740481C1C}">
+                <a14:useLocalDpi xmlns:a14="http://schemas.microsoft.com/office/drawing/2010/main" val="0"/>
+              </a:ext>
+            </a:extLst>
+          </a:blip>
+          <a:stretch>
+            <a:fillRect/>
+          </a:stretch>
+        </p:blipFill>
+        <p:spPr>
+          <a:xfrm>
+            <a:off x="6867304" y="4761650"/>
+            <a:ext cx="1784784" cy="1784784"/>
+          </a:xfrm>
+          <a:prstGeom prst="rect">
+            <a:avLst/>
+          </a:prstGeom>
+        </p:spPr>
+      </p:pic>
     </p:spTree>
     <p:extLst>
       <p:ext uri="{BB962C8B-B14F-4D97-AF65-F5344CB8AC3E}">

</xml_diff>